<commit_message>
Diapo fini (Manque Albert)
</commit_message>
<xml_diff>
--- a/Projet/Rendu final diapo.pptx
+++ b/Projet/Rendu final diapo.pptx
@@ -9,13 +9,17 @@
     <p:sldId id="260" r:id="rId3"/>
     <p:sldId id="259" r:id="rId4"/>
     <p:sldId id="264" r:id="rId5"/>
-    <p:sldId id="265" r:id="rId6"/>
-    <p:sldId id="266" r:id="rId7"/>
-    <p:sldId id="257" r:id="rId8"/>
-    <p:sldId id="258" r:id="rId9"/>
-    <p:sldId id="261" r:id="rId10"/>
-    <p:sldId id="262" r:id="rId11"/>
-    <p:sldId id="263" r:id="rId12"/>
+    <p:sldId id="267" r:id="rId6"/>
+    <p:sldId id="265" r:id="rId7"/>
+    <p:sldId id="269" r:id="rId8"/>
+    <p:sldId id="268" r:id="rId9"/>
+    <p:sldId id="266" r:id="rId10"/>
+    <p:sldId id="270" r:id="rId11"/>
+    <p:sldId id="257" r:id="rId12"/>
+    <p:sldId id="258" r:id="rId13"/>
+    <p:sldId id="261" r:id="rId14"/>
+    <p:sldId id="262" r:id="rId15"/>
+    <p:sldId id="263" r:id="rId16"/>
   </p:sldIdLst>
   <p:sldSz cx="9144000" cy="6858000" type="screen4x3"/>
   <p:notesSz cx="6858000" cy="9144000"/>
@@ -3087,38 +3091,62 @@
           <a:lstStyle/>
           <a:p>
             <a:r>
+              <a:rPr lang="fr-FR" b="1" u="sng" dirty="0" smtClean="0">
+                <a:solidFill>
+                  <a:srgbClr val="FF0000"/>
+                </a:solidFill>
+              </a:rPr>
+              <a:t>Projet Web dynamique </a:t>
+            </a:r>
+            <a:endParaRPr lang="fr-FR" b="1" u="sng" dirty="0">
+              <a:solidFill>
+                <a:srgbClr val="FF0000"/>
+              </a:solidFill>
+            </a:endParaRPr>
+          </a:p>
+        </p:txBody>
+      </p:sp>
+      <p:sp>
+        <p:nvSpPr>
+          <p:cNvPr id="3" name="Sous-titre 2"/>
+          <p:cNvSpPr>
+            <a:spLocks noGrp="1"/>
+          </p:cNvSpPr>
+          <p:nvPr>
+            <p:ph type="subTitle" idx="1"/>
+          </p:nvPr>
+        </p:nvSpPr>
+        <p:spPr/>
+        <p:txBody>
+          <a:bodyPr/>
+          <a:lstStyle/>
+          <a:p>
+            <a:r>
+              <a:rPr lang="fr-FR" dirty="0" smtClean="0">
+                <a:solidFill>
+                  <a:srgbClr val="00B050"/>
+                </a:solidFill>
+              </a:rPr>
+              <a:t>Social Media Professionnel</a:t>
+            </a:r>
+            <a:br>
+              <a:rPr lang="fr-FR" dirty="0" smtClean="0">
+                <a:solidFill>
+                  <a:srgbClr val="00B050"/>
+                </a:solidFill>
+              </a:rPr>
+            </a:br>
+            <a:r>
+              <a:rPr lang="fr-FR" dirty="0" smtClean="0">
+                <a:solidFill>
+                  <a:srgbClr val="00B050"/>
+                </a:solidFill>
+              </a:rPr>
+              <a:t>pour la communauté ECE Paris</a:t>
+            </a:r>
+            <a:r>
               <a:rPr lang="fr-FR" dirty="0" smtClean="0"/>
-              <a:t>Projet Web dynamique </a:t>
-            </a:r>
-            <a:endParaRPr lang="fr-FR" dirty="0"/>
-          </a:p>
-        </p:txBody>
-      </p:sp>
-      <p:sp>
-        <p:nvSpPr>
-          <p:cNvPr id="3" name="Sous-titre 2"/>
-          <p:cNvSpPr>
-            <a:spLocks noGrp="1"/>
-          </p:cNvSpPr>
-          <p:nvPr>
-            <p:ph type="subTitle" idx="1"/>
-          </p:nvPr>
-        </p:nvSpPr>
-        <p:spPr/>
-        <p:txBody>
-          <a:bodyPr/>
-          <a:lstStyle/>
-          <a:p>
-            <a:r>
-              <a:rPr lang="fr-FR" dirty="0" smtClean="0"/>
-              <a:t>Social Media Professionnel</a:t>
-            </a:r>
-            <a:br>
-              <a:rPr lang="fr-FR" dirty="0" smtClean="0"/>
-            </a:br>
-            <a:r>
-              <a:rPr lang="fr-FR" dirty="0" smtClean="0"/>
-              <a:t>pour la communauté ECE Paris</a:t>
+              <a:t/>
             </a:r>
             <a:br>
               <a:rPr lang="fr-FR" dirty="0" smtClean="0"/>
@@ -3198,53 +3226,50 @@
           <a:chExt cx="0" cy="0"/>
         </a:xfrm>
       </p:grpSpPr>
-      <p:sp>
-        <p:nvSpPr>
-          <p:cNvPr id="2" name="Titre 1"/>
-          <p:cNvSpPr>
-            <a:spLocks noGrp="1"/>
-          </p:cNvSpPr>
-          <p:nvPr>
-            <p:ph type="title"/>
-          </p:nvPr>
-        </p:nvSpPr>
-        <p:spPr/>
-        <p:txBody>
-          <a:bodyPr/>
-          <a:lstStyle/>
-          <a:p>
-            <a:r>
-              <a:rPr lang="fr-FR" dirty="0" smtClean="0"/>
-              <a:t>Bilan Projet</a:t>
-            </a:r>
-            <a:endParaRPr lang="fr-FR" dirty="0"/>
-          </a:p>
-        </p:txBody>
-      </p:sp>
-      <p:sp>
-        <p:nvSpPr>
-          <p:cNvPr id="3" name="Espace réservé du contenu 2"/>
-          <p:cNvSpPr>
-            <a:spLocks noGrp="1"/>
-          </p:cNvSpPr>
-          <p:nvPr>
-            <p:ph idx="1"/>
-          </p:nvPr>
-        </p:nvSpPr>
-        <p:spPr/>
-        <p:txBody>
-          <a:bodyPr/>
-          <a:lstStyle/>
-          <a:p>
-            <a:endParaRPr lang="fr-FR"/>
-          </a:p>
-        </p:txBody>
-      </p:sp>
+      <p:pic>
+        <p:nvPicPr>
+          <p:cNvPr id="27650" name="Picture 2"/>
+          <p:cNvPicPr>
+            <a:picLocks noChangeAspect="1" noChangeArrowheads="1"/>
+          </p:cNvPicPr>
+          <p:nvPr/>
+        </p:nvPicPr>
+        <p:blipFill>
+          <a:blip r:embed="rId2" cstate="print"/>
+          <a:srcRect/>
+          <a:stretch>
+            <a:fillRect/>
+          </a:stretch>
+        </p:blipFill>
+        <p:spPr bwMode="auto">
+          <a:xfrm>
+            <a:off x="0" y="0"/>
+            <a:ext cx="9200678" cy="6858000"/>
+          </a:xfrm>
+          <a:prstGeom prst="rect">
+            <a:avLst/>
+          </a:prstGeom>
+          <a:noFill/>
+          <a:ln w="9525">
+            <a:noFill/>
+            <a:miter lim="800000"/>
+            <a:headEnd/>
+            <a:tailEnd/>
+          </a:ln>
+        </p:spPr>
+      </p:pic>
     </p:spTree>
   </p:cSld>
   <p:clrMapOvr>
     <a:masterClrMapping/>
   </p:clrMapOvr>
+  <p:timing>
+    <p:tnLst>
+      <p:par>
+        <p:cTn id="1" dur="indefinite" restart="never" nodeType="tmRoot"/>
+      </p:par>
+    </p:tnLst>
+  </p:timing>
 </p:sld>
 </file>
 
@@ -3281,29 +3306,804 @@
           <a:lstStyle/>
           <a:p>
             <a:r>
+              <a:rPr lang="fr-FR" b="1" u="sng" dirty="0" smtClean="0">
+                <a:solidFill>
+                  <a:srgbClr val="FF0000"/>
+                </a:solidFill>
+              </a:rPr>
+              <a:t>Bilan personnel Albéric</a:t>
+            </a:r>
+            <a:endParaRPr lang="fr-FR" b="1" u="sng" dirty="0">
+              <a:solidFill>
+                <a:srgbClr val="FF0000"/>
+              </a:solidFill>
+            </a:endParaRPr>
+          </a:p>
+        </p:txBody>
+      </p:sp>
+      <p:sp>
+        <p:nvSpPr>
+          <p:cNvPr id="3" name="Espace réservé du contenu 2"/>
+          <p:cNvSpPr>
+            <a:spLocks noGrp="1"/>
+          </p:cNvSpPr>
+          <p:nvPr>
+            <p:ph idx="1"/>
+          </p:nvPr>
+        </p:nvSpPr>
+        <p:spPr/>
+        <p:txBody>
+          <a:bodyPr>
+            <a:normAutofit lnSpcReduction="10000"/>
+          </a:bodyPr>
+          <a:lstStyle/>
+          <a:p>
+            <a:endParaRPr lang="fr-FR" dirty="0" smtClean="0"/>
+          </a:p>
+          <a:p>
+            <a:r>
               <a:rPr lang="fr-FR" dirty="0" smtClean="0"/>
+              <a:t>Objectif: Réussir à mener le projet à son terme.</a:t>
+            </a:r>
+            <a:endParaRPr lang="fr-FR" dirty="0" smtClean="0"/>
+          </a:p>
+          <a:p>
+            <a:r>
+              <a:rPr lang="fr-FR" dirty="0" smtClean="0"/>
+              <a:t>Résultat: Malgré quelque difficulté, le projet est fonctionnel.</a:t>
+            </a:r>
+            <a:endParaRPr lang="fr-FR" dirty="0" smtClean="0"/>
+          </a:p>
+          <a:p>
+            <a:r>
+              <a:rPr lang="fr-FR" dirty="0" smtClean="0"/>
+              <a:t>Ce que j’ai appris: Me </a:t>
+            </a:r>
+            <a:r>
+              <a:rPr lang="fr-FR" dirty="0" smtClean="0"/>
+              <a:t>rendre compte de manière concrète de l'importance de l'architecture d'une base de </a:t>
+            </a:r>
+            <a:r>
+              <a:rPr lang="fr-FR" dirty="0" smtClean="0"/>
+              <a:t>données et découvrir </a:t>
+            </a:r>
+            <a:r>
+              <a:rPr lang="fr-FR" dirty="0" smtClean="0"/>
+              <a:t>le </a:t>
+            </a:r>
+            <a:r>
+              <a:rPr lang="fr-FR" dirty="0" err="1" smtClean="0"/>
+              <a:t>framework</a:t>
+            </a:r>
+            <a:r>
+              <a:rPr lang="fr-FR" dirty="0" smtClean="0"/>
+              <a:t> </a:t>
+            </a:r>
+            <a:r>
+              <a:rPr lang="fr-FR" dirty="0" err="1" smtClean="0"/>
+              <a:t>boostrap</a:t>
+            </a:r>
+            <a:r>
+              <a:rPr lang="fr-FR" dirty="0" smtClean="0"/>
+              <a:t> en </a:t>
+            </a:r>
+            <a:r>
+              <a:rPr lang="fr-FR" dirty="0" smtClean="0"/>
+              <a:t>html.</a:t>
+            </a:r>
+            <a:endParaRPr lang="fr-FR" dirty="0"/>
+          </a:p>
+        </p:txBody>
+      </p:sp>
+    </p:spTree>
+  </p:cSld>
+  <p:clrMapOvr>
+    <a:masterClrMapping/>
+  </p:clrMapOvr>
+  <p:timing>
+    <p:tnLst>
+      <p:par>
+        <p:cTn id="1" dur="indefinite" restart="never" nodeType="tmRoot"/>
+      </p:par>
+    </p:tnLst>
+  </p:timing>
+</p:sld>
+</file>
+
+<file path=ppt/slides/slide12.xml><?xml version="1.0" encoding="utf-8"?>
+<p:sld xmlns:a="http://schemas.openxmlformats.org/drawingml/2006/main" xmlns:r="http://schemas.openxmlformats.org/officeDocument/2006/relationships" xmlns:p="http://schemas.openxmlformats.org/presentationml/2006/main">
+  <p:cSld>
+    <p:spTree>
+      <p:nvGrpSpPr>
+        <p:cNvPr id="1" name=""/>
+        <p:cNvGrpSpPr/>
+        <p:nvPr/>
+      </p:nvGrpSpPr>
+      <p:grpSpPr>
+        <a:xfrm>
+          <a:off x="0" y="0"/>
+          <a:ext cx="0" cy="0"/>
+          <a:chOff x="0" y="0"/>
+          <a:chExt cx="0" cy="0"/>
+        </a:xfrm>
+      </p:grpSpPr>
+      <p:sp>
+        <p:nvSpPr>
+          <p:cNvPr id="2" name="Titre 1"/>
+          <p:cNvSpPr>
+            <a:spLocks noGrp="1"/>
+          </p:cNvSpPr>
+          <p:nvPr>
+            <p:ph type="title"/>
+          </p:nvPr>
+        </p:nvSpPr>
+        <p:spPr/>
+        <p:txBody>
+          <a:bodyPr/>
+          <a:lstStyle/>
+          <a:p>
+            <a:r>
+              <a:rPr lang="fr-FR" b="1" u="sng" dirty="0" smtClean="0">
+                <a:solidFill>
+                  <a:srgbClr val="FF0000"/>
+                </a:solidFill>
+              </a:rPr>
+              <a:t>Bilan Personnel Albert</a:t>
+            </a:r>
+            <a:endParaRPr lang="fr-FR" b="1" u="sng" dirty="0">
+              <a:solidFill>
+                <a:srgbClr val="FF0000"/>
+              </a:solidFill>
+            </a:endParaRPr>
+          </a:p>
+        </p:txBody>
+      </p:sp>
+      <p:sp>
+        <p:nvSpPr>
+          <p:cNvPr id="3" name="Espace réservé du contenu 2"/>
+          <p:cNvSpPr>
+            <a:spLocks noGrp="1"/>
+          </p:cNvSpPr>
+          <p:nvPr>
+            <p:ph idx="1"/>
+          </p:nvPr>
+        </p:nvSpPr>
+        <p:spPr/>
+        <p:txBody>
+          <a:bodyPr/>
+          <a:lstStyle/>
+          <a:p>
+            <a:endParaRPr lang="fr-FR" dirty="0" smtClean="0"/>
+          </a:p>
+          <a:p>
+            <a:r>
+              <a:rPr lang="fr-FR" dirty="0" smtClean="0"/>
+              <a:t>Objectif</a:t>
+            </a:r>
+            <a:r>
+              <a:rPr lang="fr-FR" dirty="0" smtClean="0"/>
+              <a:t>: </a:t>
+            </a:r>
+            <a:endParaRPr lang="fr-FR" dirty="0" smtClean="0"/>
+          </a:p>
+          <a:p>
+            <a:endParaRPr lang="fr-FR" dirty="0" smtClean="0"/>
+          </a:p>
+          <a:p>
+            <a:r>
+              <a:rPr lang="fr-FR" dirty="0" smtClean="0"/>
+              <a:t>Résultat:</a:t>
+            </a:r>
+          </a:p>
+          <a:p>
+            <a:endParaRPr lang="fr-FR" dirty="0" smtClean="0"/>
+          </a:p>
+          <a:p>
+            <a:r>
+              <a:rPr lang="fr-FR" dirty="0" smtClean="0"/>
+              <a:t>Ce que j’ai appris:</a:t>
+            </a:r>
+            <a:endParaRPr lang="fr-FR" dirty="0"/>
+          </a:p>
+        </p:txBody>
+      </p:sp>
+    </p:spTree>
+  </p:cSld>
+  <p:clrMapOvr>
+    <a:masterClrMapping/>
+  </p:clrMapOvr>
+  <p:timing>
+    <p:tnLst>
+      <p:par>
+        <p:cTn id="1" dur="indefinite" restart="never" nodeType="tmRoot"/>
+      </p:par>
+    </p:tnLst>
+  </p:timing>
+</p:sld>
+</file>
+
+<file path=ppt/slides/slide13.xml><?xml version="1.0" encoding="utf-8"?>
+<p:sld xmlns:a="http://schemas.openxmlformats.org/drawingml/2006/main" xmlns:r="http://schemas.openxmlformats.org/officeDocument/2006/relationships" xmlns:p="http://schemas.openxmlformats.org/presentationml/2006/main">
+  <p:cSld>
+    <p:spTree>
+      <p:nvGrpSpPr>
+        <p:cNvPr id="1" name=""/>
+        <p:cNvGrpSpPr/>
+        <p:nvPr/>
+      </p:nvGrpSpPr>
+      <p:grpSpPr>
+        <a:xfrm>
+          <a:off x="0" y="0"/>
+          <a:ext cx="0" cy="0"/>
+          <a:chOff x="0" y="0"/>
+          <a:chExt cx="0" cy="0"/>
+        </a:xfrm>
+      </p:grpSpPr>
+      <p:sp>
+        <p:nvSpPr>
+          <p:cNvPr id="2" name="Titre 1"/>
+          <p:cNvSpPr>
+            <a:spLocks noGrp="1"/>
+          </p:cNvSpPr>
+          <p:nvPr>
+            <p:ph type="title"/>
+          </p:nvPr>
+        </p:nvSpPr>
+        <p:spPr/>
+        <p:txBody>
+          <a:bodyPr/>
+          <a:lstStyle/>
+          <a:p>
+            <a:r>
+              <a:rPr lang="fr-FR" b="1" u="sng" dirty="0" smtClean="0">
+                <a:solidFill>
+                  <a:srgbClr val="FF0000"/>
+                </a:solidFill>
+              </a:rPr>
+              <a:t>Bilan Yann</a:t>
+            </a:r>
+            <a:endParaRPr lang="fr-FR" b="1" u="sng" dirty="0">
+              <a:solidFill>
+                <a:srgbClr val="FF0000"/>
+              </a:solidFill>
+            </a:endParaRPr>
+          </a:p>
+        </p:txBody>
+      </p:sp>
+      <p:sp>
+        <p:nvSpPr>
+          <p:cNvPr id="3" name="Espace réservé du contenu 2"/>
+          <p:cNvSpPr>
+            <a:spLocks noGrp="1"/>
+          </p:cNvSpPr>
+          <p:nvPr>
+            <p:ph idx="1"/>
+          </p:nvPr>
+        </p:nvSpPr>
+        <p:spPr/>
+        <p:txBody>
+          <a:bodyPr/>
+          <a:lstStyle/>
+          <a:p>
+            <a:endParaRPr lang="fr-FR" dirty="0" smtClean="0"/>
+          </a:p>
+          <a:p>
+            <a:r>
+              <a:rPr lang="fr-FR" dirty="0" smtClean="0"/>
+              <a:t>Objectif: coder la liaison entre les page (</a:t>
+            </a:r>
+            <a:r>
+              <a:rPr lang="fr-FR" dirty="0" err="1" smtClean="0"/>
+              <a:t>php</a:t>
+            </a:r>
+            <a:r>
+              <a:rPr lang="fr-FR" dirty="0" smtClean="0"/>
+              <a:t>) </a:t>
+            </a:r>
+          </a:p>
+          <a:p>
+            <a:endParaRPr lang="fr-FR" dirty="0" smtClean="0"/>
+          </a:p>
+          <a:p>
+            <a:r>
+              <a:rPr lang="fr-FR" dirty="0" smtClean="0"/>
+              <a:t>Résultat</a:t>
+            </a:r>
+            <a:r>
+              <a:rPr lang="fr-FR" dirty="0" smtClean="0"/>
+              <a:t>: Les liaisons fonctionnent malgré certaines qui manquent dû à des problèmes de connexion.</a:t>
+            </a:r>
+            <a:endParaRPr lang="fr-FR" dirty="0" smtClean="0"/>
+          </a:p>
+          <a:p>
+            <a:r>
+              <a:rPr lang="fr-FR" dirty="0" smtClean="0"/>
+              <a:t>Ce qu</a:t>
+            </a:r>
+            <a:r>
+              <a:rPr lang="fr-FR" dirty="0" smtClean="0"/>
+              <a:t>e j’ai appris: J’ai pu apprendre à vraiment utilisé </a:t>
+            </a:r>
+            <a:r>
+              <a:rPr lang="fr-FR" dirty="0" err="1" smtClean="0"/>
+              <a:t>php</a:t>
+            </a:r>
+            <a:r>
+              <a:rPr lang="fr-FR" dirty="0" smtClean="0"/>
+              <a:t> et le lien entre chacun des fichiers.</a:t>
+            </a:r>
+            <a:endParaRPr lang="fr-FR" dirty="0"/>
+          </a:p>
+        </p:txBody>
+      </p:sp>
+    </p:spTree>
+  </p:cSld>
+  <p:clrMapOvr>
+    <a:masterClrMapping/>
+  </p:clrMapOvr>
+</p:sld>
+</file>
+
+<file path=ppt/slides/slide14.xml><?xml version="1.0" encoding="utf-8"?>
+<p:sld xmlns:a="http://schemas.openxmlformats.org/drawingml/2006/main" xmlns:r="http://schemas.openxmlformats.org/officeDocument/2006/relationships" xmlns:p="http://schemas.openxmlformats.org/presentationml/2006/main">
+  <p:cSld>
+    <p:spTree>
+      <p:nvGrpSpPr>
+        <p:cNvPr id="1" name=""/>
+        <p:cNvGrpSpPr/>
+        <p:nvPr/>
+      </p:nvGrpSpPr>
+      <p:grpSpPr>
+        <a:xfrm>
+          <a:off x="0" y="0"/>
+          <a:ext cx="0" cy="0"/>
+          <a:chOff x="0" y="0"/>
+          <a:chExt cx="0" cy="0"/>
+        </a:xfrm>
+      </p:grpSpPr>
+      <p:sp>
+        <p:nvSpPr>
+          <p:cNvPr id="2" name="Titre 1"/>
+          <p:cNvSpPr>
+            <a:spLocks noGrp="1"/>
+          </p:cNvSpPr>
+          <p:nvPr>
+            <p:ph type="title"/>
+          </p:nvPr>
+        </p:nvSpPr>
+        <p:spPr/>
+        <p:txBody>
+          <a:bodyPr/>
+          <a:lstStyle/>
+          <a:p>
+            <a:r>
+              <a:rPr lang="fr-FR" b="1" u="sng" dirty="0" smtClean="0">
+                <a:solidFill>
+                  <a:srgbClr val="FF0000"/>
+                </a:solidFill>
+              </a:rPr>
+              <a:t>Bilan Projet</a:t>
+            </a:r>
+            <a:endParaRPr lang="fr-FR" b="1" u="sng" dirty="0">
+              <a:solidFill>
+                <a:srgbClr val="FF0000"/>
+              </a:solidFill>
+            </a:endParaRPr>
+          </a:p>
+        </p:txBody>
+      </p:sp>
+      <p:sp>
+        <p:nvSpPr>
+          <p:cNvPr id="4" name="Espace réservé du contenu 2"/>
+          <p:cNvSpPr txBox="1">
+            <a:spLocks/>
+          </p:cNvSpPr>
+          <p:nvPr/>
+        </p:nvSpPr>
+        <p:spPr>
+          <a:xfrm>
+            <a:off x="395536" y="1556792"/>
+            <a:ext cx="8229600" cy="4525963"/>
+          </a:xfrm>
+          <a:prstGeom prst="rect">
+            <a:avLst/>
+          </a:prstGeom>
+        </p:spPr>
+        <p:txBody>
+          <a:bodyPr vert="horz" lIns="91440" tIns="45720" rIns="91440" bIns="45720" rtlCol="0">
+            <a:normAutofit/>
+          </a:bodyPr>
+          <a:lstStyle/>
+          <a:p>
+            <a:pPr marL="342900" marR="0" lvl="0" indent="-342900" algn="l" defTabSz="914400" rtl="0" eaLnBrk="1" fontAlgn="auto" latinLnBrk="0" hangingPunct="1">
+              <a:lnSpc>
+                <a:spcPct val="100000"/>
+              </a:lnSpc>
+              <a:spcBef>
+                <a:spcPct val="20000"/>
+              </a:spcBef>
+              <a:spcAft>
+                <a:spcPts val="0"/>
+              </a:spcAft>
+              <a:buClrTx/>
+              <a:buSzTx/>
+              <a:buFont typeface="Arial" pitchFamily="34" charset="0"/>
+              <a:buChar char="•"/>
+              <a:tabLst/>
+              <a:defRPr/>
+            </a:pPr>
+            <a:endParaRPr kumimoji="0" lang="fr-FR" sz="3200" b="0" i="0" u="none" strike="noStrike" kern="1200" cap="none" spc="0" normalizeH="0" baseline="0" noProof="0" dirty="0" smtClean="0">
+              <a:ln>
+                <a:noFill/>
+              </a:ln>
+              <a:solidFill>
+                <a:schemeClr val="tx1"/>
+              </a:solidFill>
+              <a:effectLst/>
+              <a:uLnTx/>
+              <a:uFillTx/>
+              <a:latin typeface="+mn-lt"/>
+              <a:ea typeface="+mn-ea"/>
+              <a:cs typeface="+mn-cs"/>
+            </a:endParaRPr>
+          </a:p>
+          <a:p>
+            <a:pPr marL="342900" marR="0" lvl="0" indent="-342900" algn="l" defTabSz="914400" rtl="0" eaLnBrk="1" fontAlgn="auto" latinLnBrk="0" hangingPunct="1">
+              <a:lnSpc>
+                <a:spcPct val="100000"/>
+              </a:lnSpc>
+              <a:spcBef>
+                <a:spcPct val="20000"/>
+              </a:spcBef>
+              <a:spcAft>
+                <a:spcPts val="0"/>
+              </a:spcAft>
+              <a:buClrTx/>
+              <a:buSzTx/>
+              <a:buFont typeface="Arial" pitchFamily="34" charset="0"/>
+              <a:buChar char="•"/>
+              <a:tabLst/>
+              <a:defRPr/>
+            </a:pPr>
+            <a:r>
+              <a:rPr kumimoji="0" lang="fr-FR" sz="3200" b="0" i="0" u="none" strike="noStrike" kern="1200" cap="none" spc="0" normalizeH="0" baseline="0" noProof="0" dirty="0" smtClean="0">
+                <a:ln>
+                  <a:noFill/>
+                </a:ln>
+                <a:solidFill>
+                  <a:schemeClr val="tx1"/>
+                </a:solidFill>
+                <a:effectLst/>
+                <a:uLnTx/>
+                <a:uFillTx/>
+                <a:latin typeface="+mn-lt"/>
+                <a:ea typeface="+mn-ea"/>
+                <a:cs typeface="+mn-cs"/>
+              </a:rPr>
+              <a:t>Objectif: Réussir à créer</a:t>
+            </a:r>
+            <a:r>
+              <a:rPr kumimoji="0" lang="fr-FR" sz="3200" b="0" i="0" u="none" strike="noStrike" kern="1200" cap="none" spc="0" normalizeH="0" noProof="0" dirty="0" smtClean="0">
+                <a:ln>
+                  <a:noFill/>
+                </a:ln>
+                <a:solidFill>
+                  <a:schemeClr val="tx1"/>
+                </a:solidFill>
+                <a:effectLst/>
+                <a:uLnTx/>
+                <a:uFillTx/>
+                <a:latin typeface="+mn-lt"/>
+                <a:ea typeface="+mn-ea"/>
+                <a:cs typeface="+mn-cs"/>
+              </a:rPr>
+              <a:t> un réseau simple mais efficace.</a:t>
+            </a:r>
+            <a:endParaRPr kumimoji="0" lang="fr-FR" sz="3200" b="0" i="0" u="none" strike="noStrike" kern="1200" cap="none" spc="0" normalizeH="0" baseline="0" noProof="0" dirty="0" smtClean="0">
+              <a:ln>
+                <a:noFill/>
+              </a:ln>
+              <a:solidFill>
+                <a:schemeClr val="tx1"/>
+              </a:solidFill>
+              <a:effectLst/>
+              <a:uLnTx/>
+              <a:uFillTx/>
+              <a:latin typeface="+mn-lt"/>
+              <a:ea typeface="+mn-ea"/>
+              <a:cs typeface="+mn-cs"/>
+            </a:endParaRPr>
+          </a:p>
+          <a:p>
+            <a:pPr marL="342900" marR="0" lvl="0" indent="-342900" algn="l" defTabSz="914400" rtl="0" eaLnBrk="1" fontAlgn="auto" latinLnBrk="0" hangingPunct="1">
+              <a:lnSpc>
+                <a:spcPct val="100000"/>
+              </a:lnSpc>
+              <a:spcBef>
+                <a:spcPct val="20000"/>
+              </a:spcBef>
+              <a:spcAft>
+                <a:spcPts val="0"/>
+              </a:spcAft>
+              <a:buClrTx/>
+              <a:buSzTx/>
+              <a:buFont typeface="Arial" pitchFamily="34" charset="0"/>
+              <a:buChar char="•"/>
+              <a:tabLst/>
+              <a:defRPr/>
+            </a:pPr>
+            <a:r>
+              <a:rPr kumimoji="0" lang="fr-FR" sz="3200" b="0" i="0" u="none" strike="noStrike" kern="1200" cap="none" spc="0" normalizeH="0" baseline="0" noProof="0" dirty="0" smtClean="0">
+                <a:ln>
+                  <a:noFill/>
+                </a:ln>
+                <a:solidFill>
+                  <a:schemeClr val="tx1"/>
+                </a:solidFill>
+                <a:effectLst/>
+                <a:uLnTx/>
+                <a:uFillTx/>
+                <a:latin typeface="+mn-lt"/>
+                <a:ea typeface="+mn-ea"/>
+                <a:cs typeface="+mn-cs"/>
+              </a:rPr>
+              <a:t>Résultat: Nous avons un affichage simple qui fonctionne</a:t>
+            </a:r>
+          </a:p>
+          <a:p>
+            <a:pPr marL="342900" marR="0" lvl="0" indent="-342900" algn="l" defTabSz="914400" rtl="0" eaLnBrk="1" fontAlgn="auto" latinLnBrk="0" hangingPunct="1">
+              <a:lnSpc>
+                <a:spcPct val="100000"/>
+              </a:lnSpc>
+              <a:spcBef>
+                <a:spcPct val="20000"/>
+              </a:spcBef>
+              <a:spcAft>
+                <a:spcPts val="0"/>
+              </a:spcAft>
+              <a:buClrTx/>
+              <a:buSzTx/>
+              <a:buFont typeface="Arial" pitchFamily="34" charset="0"/>
+              <a:buChar char="•"/>
+              <a:tabLst/>
+              <a:defRPr/>
+            </a:pPr>
+            <a:r>
+              <a:rPr kumimoji="0" lang="fr-FR" sz="3200" b="0" i="0" u="none" strike="noStrike" kern="1200" cap="none" spc="0" normalizeH="0" baseline="0" noProof="0" dirty="0" smtClean="0">
+                <a:ln>
+                  <a:noFill/>
+                </a:ln>
+                <a:solidFill>
+                  <a:schemeClr val="tx1"/>
+                </a:solidFill>
+                <a:effectLst/>
+                <a:uLnTx/>
+                <a:uFillTx/>
+                <a:latin typeface="+mn-lt"/>
+                <a:ea typeface="+mn-ea"/>
+                <a:cs typeface="+mn-cs"/>
+              </a:rPr>
+              <a:t>Ce que nous</a:t>
+            </a:r>
+            <a:r>
+              <a:rPr kumimoji="0" lang="fr-FR" sz="3200" b="0" i="0" u="none" strike="noStrike" kern="1200" cap="none" spc="0" normalizeH="0" noProof="0" dirty="0" smtClean="0">
+                <a:ln>
+                  <a:noFill/>
+                </a:ln>
+                <a:solidFill>
+                  <a:schemeClr val="tx1"/>
+                </a:solidFill>
+                <a:effectLst/>
+                <a:uLnTx/>
+                <a:uFillTx/>
+                <a:latin typeface="+mn-lt"/>
+                <a:ea typeface="+mn-ea"/>
+                <a:cs typeface="+mn-cs"/>
+              </a:rPr>
+              <a:t> aurions</a:t>
+            </a:r>
+            <a:r>
+              <a:rPr kumimoji="0" lang="fr-FR" sz="3200" b="0" i="0" u="none" strike="noStrike" kern="1200" cap="none" spc="0" normalizeH="0" baseline="0" noProof="0" dirty="0" smtClean="0">
+                <a:ln>
+                  <a:noFill/>
+                </a:ln>
+                <a:solidFill>
+                  <a:schemeClr val="tx1"/>
+                </a:solidFill>
+                <a:effectLst/>
+                <a:uLnTx/>
+                <a:uFillTx/>
+                <a:latin typeface="+mn-lt"/>
+                <a:ea typeface="+mn-ea"/>
+                <a:cs typeface="+mn-cs"/>
+              </a:rPr>
+              <a:t> à</a:t>
+            </a:r>
+            <a:r>
+              <a:rPr kumimoji="0" lang="fr-FR" sz="3200" b="0" i="0" u="none" strike="noStrike" kern="1200" cap="none" spc="0" normalizeH="0" noProof="0" dirty="0" smtClean="0">
+                <a:ln>
+                  <a:noFill/>
+                </a:ln>
+                <a:solidFill>
+                  <a:schemeClr val="tx1"/>
+                </a:solidFill>
+                <a:effectLst/>
+                <a:uLnTx/>
+                <a:uFillTx/>
+                <a:latin typeface="+mn-lt"/>
+                <a:ea typeface="+mn-ea"/>
+                <a:cs typeface="+mn-cs"/>
+              </a:rPr>
+              <a:t> améliorer</a:t>
+            </a:r>
+            <a:r>
+              <a:rPr kumimoji="0" lang="fr-FR" sz="3200" b="0" i="0" u="none" strike="noStrike" kern="1200" cap="none" spc="0" normalizeH="0" baseline="0" noProof="0" dirty="0" smtClean="0">
+                <a:ln>
+                  <a:noFill/>
+                </a:ln>
+                <a:solidFill>
+                  <a:schemeClr val="tx1"/>
+                </a:solidFill>
+                <a:effectLst/>
+                <a:uLnTx/>
+                <a:uFillTx/>
+                <a:latin typeface="+mn-lt"/>
+                <a:ea typeface="+mn-ea"/>
+                <a:cs typeface="+mn-cs"/>
+              </a:rPr>
+              <a:t>: les liens entre les pages et la mise en place des images</a:t>
+            </a:r>
+            <a:r>
+              <a:rPr kumimoji="0" lang="fr-FR" sz="3200" b="0" i="0" u="none" strike="noStrike" kern="1200" cap="none" spc="0" normalizeH="0" noProof="0" dirty="0" smtClean="0">
+                <a:ln>
+                  <a:noFill/>
+                </a:ln>
+                <a:solidFill>
+                  <a:schemeClr val="tx1"/>
+                </a:solidFill>
+                <a:effectLst/>
+                <a:uLnTx/>
+                <a:uFillTx/>
+                <a:latin typeface="+mn-lt"/>
+                <a:ea typeface="+mn-ea"/>
+                <a:cs typeface="+mn-cs"/>
+              </a:rPr>
+              <a:t> et le changement de nom dans le profil.</a:t>
+            </a:r>
+            <a:endParaRPr kumimoji="0" lang="fr-FR" sz="3200" b="0" i="0" u="none" strike="noStrike" kern="1200" cap="none" spc="0" normalizeH="0" baseline="0" noProof="0" dirty="0">
+              <a:ln>
+                <a:noFill/>
+              </a:ln>
+              <a:solidFill>
+                <a:schemeClr val="tx1"/>
+              </a:solidFill>
+              <a:effectLst/>
+              <a:uLnTx/>
+              <a:uFillTx/>
+              <a:latin typeface="+mn-lt"/>
+              <a:ea typeface="+mn-ea"/>
+              <a:cs typeface="+mn-cs"/>
+            </a:endParaRPr>
+          </a:p>
+        </p:txBody>
+      </p:sp>
+    </p:spTree>
+  </p:cSld>
+  <p:clrMapOvr>
+    <a:masterClrMapping/>
+  </p:clrMapOvr>
+</p:sld>
+</file>
+
+<file path=ppt/slides/slide15.xml><?xml version="1.0" encoding="utf-8"?>
+<p:sld xmlns:a="http://schemas.openxmlformats.org/drawingml/2006/main" xmlns:r="http://schemas.openxmlformats.org/officeDocument/2006/relationships" xmlns:p="http://schemas.openxmlformats.org/presentationml/2006/main">
+  <p:cSld>
+    <p:spTree>
+      <p:nvGrpSpPr>
+        <p:cNvPr id="1" name=""/>
+        <p:cNvGrpSpPr/>
+        <p:nvPr/>
+      </p:nvGrpSpPr>
+      <p:grpSpPr>
+        <a:xfrm>
+          <a:off x="0" y="0"/>
+          <a:ext cx="0" cy="0"/>
+          <a:chOff x="0" y="0"/>
+          <a:chExt cx="0" cy="0"/>
+        </a:xfrm>
+      </p:grpSpPr>
+      <p:sp>
+        <p:nvSpPr>
+          <p:cNvPr id="2" name="Titre 1"/>
+          <p:cNvSpPr>
+            <a:spLocks noGrp="1"/>
+          </p:cNvSpPr>
+          <p:nvPr>
+            <p:ph type="title"/>
+          </p:nvPr>
+        </p:nvSpPr>
+        <p:spPr/>
+        <p:txBody>
+          <a:bodyPr/>
+          <a:lstStyle/>
+          <a:p>
+            <a:r>
+              <a:rPr lang="fr-FR" b="1" u="sng" dirty="0" smtClean="0">
+                <a:solidFill>
+                  <a:srgbClr val="FF0000"/>
+                </a:solidFill>
+              </a:rPr>
               <a:t>Bibliographie</a:t>
             </a:r>
+            <a:endParaRPr lang="fr-FR" b="1" u="sng" dirty="0">
+              <a:solidFill>
+                <a:srgbClr val="FF0000"/>
+              </a:solidFill>
+            </a:endParaRPr>
+          </a:p>
+        </p:txBody>
+      </p:sp>
+      <p:sp>
+        <p:nvSpPr>
+          <p:cNvPr id="3" name="Espace réservé du contenu 2"/>
+          <p:cNvSpPr>
+            <a:spLocks noGrp="1"/>
+          </p:cNvSpPr>
+          <p:nvPr>
+            <p:ph idx="1"/>
+          </p:nvPr>
+        </p:nvSpPr>
+        <p:spPr/>
+        <p:txBody>
+          <a:bodyPr/>
+          <a:lstStyle/>
+          <a:p>
+            <a:r>
+              <a:rPr lang="fr-FR" sz="2400" dirty="0" smtClean="0">
+                <a:hlinkClick r:id="rId2"/>
+              </a:rPr>
+              <a:t>http://</a:t>
+            </a:r>
+            <a:r>
+              <a:rPr lang="fr-FR" sz="2400" dirty="0" smtClean="0">
+                <a:hlinkClick r:id="rId2"/>
+              </a:rPr>
+              <a:t>forums.mediabox.fr/wiki/tutoriaux/php/bdd/inserer-modifier-supprimer-des-donne-php</a:t>
+            </a:r>
+            <a:endParaRPr lang="fr-FR" sz="2400" dirty="0" smtClean="0"/>
+          </a:p>
+          <a:p>
+            <a:r>
+              <a:rPr lang="fr-FR" sz="2400" dirty="0" smtClean="0">
+                <a:hlinkClick r:id="rId3"/>
+              </a:rPr>
+              <a:t>https://</a:t>
+            </a:r>
+            <a:r>
+              <a:rPr lang="fr-FR" sz="2400" dirty="0" smtClean="0">
+                <a:hlinkClick r:id="rId3"/>
+              </a:rPr>
+              <a:t>openclassrooms.com/forum/sujet/recuperer-une-variable-de-session-pour-l-ecrire-dans-la-b-10266</a:t>
+            </a:r>
+            <a:endParaRPr lang="fr-FR" sz="2400" dirty="0" smtClean="0"/>
+          </a:p>
+          <a:p>
+            <a:r>
+              <a:rPr lang="fr-FR" sz="2400" dirty="0" smtClean="0">
+                <a:hlinkClick r:id="rId4"/>
+              </a:rPr>
+              <a:t>http://php.net/manual/fr</a:t>
+            </a:r>
+            <a:r>
+              <a:rPr lang="fr-FR" sz="2400" dirty="0" smtClean="0">
+                <a:hlinkClick r:id="rId4"/>
+              </a:rPr>
+              <a:t>/</a:t>
+            </a:r>
+            <a:endParaRPr lang="fr-FR" sz="2400" dirty="0" smtClean="0"/>
+          </a:p>
+          <a:p>
             <a:endParaRPr lang="fr-FR" dirty="0"/>
-          </a:p>
-        </p:txBody>
-      </p:sp>
-      <p:sp>
-        <p:nvSpPr>
-          <p:cNvPr id="3" name="Espace réservé du contenu 2"/>
-          <p:cNvSpPr>
-            <a:spLocks noGrp="1"/>
-          </p:cNvSpPr>
-          <p:nvPr>
-            <p:ph idx="1"/>
-          </p:nvPr>
-        </p:nvSpPr>
-        <p:spPr/>
-        <p:txBody>
-          <a:bodyPr/>
-          <a:lstStyle/>
-          <a:p>
-            <a:endParaRPr lang="fr-FR"/>
           </a:p>
         </p:txBody>
       </p:sp>
@@ -3348,10 +4148,18 @@
           <a:lstStyle/>
           <a:p>
             <a:r>
-              <a:rPr lang="fr-FR" dirty="0" smtClean="0"/>
+              <a:rPr lang="fr-FR" b="1" u="sng" dirty="0" smtClean="0">
+                <a:solidFill>
+                  <a:srgbClr val="FF0000"/>
+                </a:solidFill>
+              </a:rPr>
               <a:t>Sommaire</a:t>
             </a:r>
-            <a:endParaRPr lang="fr-FR" dirty="0"/>
+            <a:endParaRPr lang="fr-FR" b="1" u="sng" dirty="0">
+              <a:solidFill>
+                <a:srgbClr val="FF0000"/>
+              </a:solidFill>
+            </a:endParaRPr>
           </a:p>
         </p:txBody>
       </p:sp>
@@ -3459,10 +4267,18 @@
           <a:lstStyle/>
           <a:p>
             <a:r>
-              <a:rPr lang="fr-FR" dirty="0" smtClean="0"/>
-              <a:t>Entité-Association</a:t>
-            </a:r>
-            <a:endParaRPr lang="fr-FR" dirty="0"/>
+              <a:rPr lang="fr-FR" b="1" u="sng" dirty="0" smtClean="0">
+                <a:solidFill>
+                  <a:srgbClr val="FF0000"/>
+                </a:solidFill>
+              </a:rPr>
+              <a:t>Entité-Association/Relation</a:t>
+            </a:r>
+            <a:endParaRPr lang="fr-FR" b="1" u="sng" dirty="0">
+              <a:solidFill>
+                <a:srgbClr val="FF0000"/>
+              </a:solidFill>
+            </a:endParaRPr>
           </a:p>
         </p:txBody>
       </p:sp>
@@ -3540,6 +4356,488 @@
           </a:p>
         </p:txBody>
       </p:sp>
+      <p:sp>
+        <p:nvSpPr>
+          <p:cNvPr id="3" name="Rectangle 2"/>
+          <p:cNvSpPr/>
+          <p:nvPr/>
+        </p:nvSpPr>
+        <p:spPr>
+          <a:xfrm>
+            <a:off x="1043608" y="6381328"/>
+            <a:ext cx="648072" cy="288032"/>
+          </a:xfrm>
+          <a:prstGeom prst="rect">
+            <a:avLst/>
+          </a:prstGeom>
+          <a:solidFill>
+            <a:srgbClr val="00B050"/>
+          </a:solidFill>
+          <a:ln>
+            <a:solidFill>
+              <a:schemeClr val="tx1"/>
+            </a:solidFill>
+          </a:ln>
+        </p:spPr>
+        <p:style>
+          <a:lnRef idx="3">
+            <a:schemeClr val="lt1"/>
+          </a:lnRef>
+          <a:fillRef idx="1">
+            <a:schemeClr val="accent3"/>
+          </a:fillRef>
+          <a:effectRef idx="1">
+            <a:schemeClr val="accent3"/>
+          </a:effectRef>
+          <a:fontRef idx="minor">
+            <a:schemeClr val="lt1"/>
+          </a:fontRef>
+        </p:style>
+        <p:txBody>
+          <a:bodyPr rtlCol="0" anchor="ctr"/>
+          <a:lstStyle/>
+          <a:p>
+            <a:pPr algn="ctr"/>
+            <a:endParaRPr lang="fr-FR" dirty="0"/>
+          </a:p>
+        </p:txBody>
+      </p:sp>
+      <p:sp>
+        <p:nvSpPr>
+          <p:cNvPr id="4" name="ZoneTexte 3"/>
+          <p:cNvSpPr txBox="1"/>
+          <p:nvPr/>
+        </p:nvSpPr>
+        <p:spPr>
+          <a:xfrm>
+            <a:off x="1691680" y="6309320"/>
+            <a:ext cx="875240" cy="369332"/>
+          </a:xfrm>
+          <a:prstGeom prst="rect">
+            <a:avLst/>
+          </a:prstGeom>
+          <a:noFill/>
+        </p:spPr>
+        <p:txBody>
+          <a:bodyPr wrap="none" rtlCol="0">
+            <a:spAutoFit/>
+          </a:bodyPr>
+          <a:lstStyle/>
+          <a:p>
+            <a:r>
+              <a:rPr lang="fr-FR" dirty="0" smtClean="0"/>
+              <a:t>: Image</a:t>
+            </a:r>
+            <a:endParaRPr lang="fr-FR" dirty="0"/>
+          </a:p>
+        </p:txBody>
+      </p:sp>
+      <p:sp>
+        <p:nvSpPr>
+          <p:cNvPr id="5" name="Rectangle 4"/>
+          <p:cNvSpPr/>
+          <p:nvPr/>
+        </p:nvSpPr>
+        <p:spPr>
+          <a:xfrm>
+            <a:off x="3707904" y="6381328"/>
+            <a:ext cx="648072" cy="288032"/>
+          </a:xfrm>
+          <a:prstGeom prst="rect">
+            <a:avLst/>
+          </a:prstGeom>
+          <a:solidFill>
+            <a:srgbClr val="FF0000"/>
+          </a:solidFill>
+          <a:ln>
+            <a:solidFill>
+              <a:schemeClr val="tx1"/>
+            </a:solidFill>
+          </a:ln>
+        </p:spPr>
+        <p:style>
+          <a:lnRef idx="3">
+            <a:schemeClr val="lt1"/>
+          </a:lnRef>
+          <a:fillRef idx="1">
+            <a:schemeClr val="accent3"/>
+          </a:fillRef>
+          <a:effectRef idx="1">
+            <a:schemeClr val="accent3"/>
+          </a:effectRef>
+          <a:fontRef idx="minor">
+            <a:schemeClr val="lt1"/>
+          </a:fontRef>
+        </p:style>
+        <p:txBody>
+          <a:bodyPr rtlCol="0" anchor="ctr"/>
+          <a:lstStyle/>
+          <a:p>
+            <a:pPr algn="ctr"/>
+            <a:endParaRPr lang="fr-FR" dirty="0"/>
+          </a:p>
+        </p:txBody>
+      </p:sp>
+      <p:sp>
+        <p:nvSpPr>
+          <p:cNvPr id="6" name="Rectangle 5"/>
+          <p:cNvSpPr/>
+          <p:nvPr/>
+        </p:nvSpPr>
+        <p:spPr>
+          <a:xfrm>
+            <a:off x="6084168" y="6381328"/>
+            <a:ext cx="648072" cy="288032"/>
+          </a:xfrm>
+          <a:prstGeom prst="rect">
+            <a:avLst/>
+          </a:prstGeom>
+          <a:solidFill>
+            <a:srgbClr val="00B0F0"/>
+          </a:solidFill>
+          <a:ln>
+            <a:solidFill>
+              <a:schemeClr val="tx1"/>
+            </a:solidFill>
+          </a:ln>
+        </p:spPr>
+        <p:style>
+          <a:lnRef idx="3">
+            <a:schemeClr val="lt1"/>
+          </a:lnRef>
+          <a:fillRef idx="1">
+            <a:schemeClr val="accent3"/>
+          </a:fillRef>
+          <a:effectRef idx="1">
+            <a:schemeClr val="accent3"/>
+          </a:effectRef>
+          <a:fontRef idx="minor">
+            <a:schemeClr val="lt1"/>
+          </a:fontRef>
+        </p:style>
+        <p:txBody>
+          <a:bodyPr rtlCol="0" anchor="ctr"/>
+          <a:lstStyle/>
+          <a:p>
+            <a:pPr algn="ctr"/>
+            <a:endParaRPr lang="fr-FR" dirty="0"/>
+          </a:p>
+        </p:txBody>
+      </p:sp>
+      <p:sp>
+        <p:nvSpPr>
+          <p:cNvPr id="7" name="ZoneTexte 6"/>
+          <p:cNvSpPr txBox="1"/>
+          <p:nvPr/>
+        </p:nvSpPr>
+        <p:spPr>
+          <a:xfrm>
+            <a:off x="4355976" y="6309320"/>
+            <a:ext cx="987130" cy="369332"/>
+          </a:xfrm>
+          <a:prstGeom prst="rect">
+            <a:avLst/>
+          </a:prstGeom>
+          <a:noFill/>
+        </p:spPr>
+        <p:txBody>
+          <a:bodyPr wrap="none" rtlCol="0">
+            <a:spAutoFit/>
+          </a:bodyPr>
+          <a:lstStyle/>
+          <a:p>
+            <a:r>
+              <a:rPr lang="fr-FR" dirty="0" smtClean="0"/>
+              <a:t>: Bouton</a:t>
+            </a:r>
+            <a:endParaRPr lang="fr-FR" dirty="0"/>
+          </a:p>
+        </p:txBody>
+      </p:sp>
+      <p:sp>
+        <p:nvSpPr>
+          <p:cNvPr id="8" name="ZoneTexte 7"/>
+          <p:cNvSpPr txBox="1"/>
+          <p:nvPr/>
+        </p:nvSpPr>
+        <p:spPr>
+          <a:xfrm>
+            <a:off x="6732240" y="6309320"/>
+            <a:ext cx="1582677" cy="369332"/>
+          </a:xfrm>
+          <a:prstGeom prst="rect">
+            <a:avLst/>
+          </a:prstGeom>
+          <a:noFill/>
+        </p:spPr>
+        <p:txBody>
+          <a:bodyPr wrap="none" rtlCol="0">
+            <a:spAutoFit/>
+          </a:bodyPr>
+          <a:lstStyle/>
+          <a:p>
+            <a:r>
+              <a:rPr lang="fr-FR" dirty="0" smtClean="0"/>
+              <a:t>: Zone de texte</a:t>
+            </a:r>
+            <a:endParaRPr lang="fr-FR" dirty="0"/>
+          </a:p>
+        </p:txBody>
+      </p:sp>
+      <p:pic>
+        <p:nvPicPr>
+          <p:cNvPr id="9" name="Image 8" descr="Page d'accueil v2.png"/>
+          <p:cNvPicPr>
+            <a:picLocks noChangeAspect="1"/>
+          </p:cNvPicPr>
+          <p:nvPr/>
+        </p:nvPicPr>
+        <p:blipFill>
+          <a:blip r:embed="rId2" cstate="print"/>
+          <a:stretch>
+            <a:fillRect/>
+          </a:stretch>
+        </p:blipFill>
+        <p:spPr>
+          <a:xfrm>
+            <a:off x="755576" y="404664"/>
+            <a:ext cx="7592142" cy="4887441"/>
+          </a:xfrm>
+          <a:prstGeom prst="rect">
+            <a:avLst/>
+          </a:prstGeom>
+          <a:ln w="38100" cap="sq">
+            <a:solidFill>
+              <a:srgbClr val="000000"/>
+            </a:solidFill>
+            <a:prstDash val="solid"/>
+            <a:miter lim="800000"/>
+          </a:ln>
+          <a:effectLst>
+            <a:outerShdw blurRad="50800" dist="38100" dir="2700000" algn="tl" rotWithShape="0">
+              <a:srgbClr val="000000">
+                <a:alpha val="43000"/>
+              </a:srgbClr>
+            </a:outerShdw>
+          </a:effectLst>
+        </p:spPr>
+      </p:pic>
+      <p:cxnSp>
+        <p:nvCxnSpPr>
+          <p:cNvPr id="14" name="Connecteur droit avec flèche 13"/>
+          <p:cNvCxnSpPr/>
+          <p:nvPr/>
+        </p:nvCxnSpPr>
+        <p:spPr>
+          <a:xfrm>
+            <a:off x="2483768" y="1772816"/>
+            <a:ext cx="288032" cy="1728192"/>
+          </a:xfrm>
+          <a:prstGeom prst="straightConnector1">
+            <a:avLst/>
+          </a:prstGeom>
+          <a:ln>
+            <a:tailEnd type="arrow"/>
+          </a:ln>
+        </p:spPr>
+        <p:style>
+          <a:lnRef idx="1">
+            <a:schemeClr val="dk1"/>
+          </a:lnRef>
+          <a:fillRef idx="0">
+            <a:schemeClr val="dk1"/>
+          </a:fillRef>
+          <a:effectRef idx="0">
+            <a:schemeClr val="dk1"/>
+          </a:effectRef>
+          <a:fontRef idx="minor">
+            <a:schemeClr val="tx1"/>
+          </a:fontRef>
+        </p:style>
+      </p:cxnSp>
+      <p:sp>
+        <p:nvSpPr>
+          <p:cNvPr id="15" name="ZoneTexte 14"/>
+          <p:cNvSpPr txBox="1"/>
+          <p:nvPr/>
+        </p:nvSpPr>
+        <p:spPr>
+          <a:xfrm>
+            <a:off x="683568" y="1484784"/>
+            <a:ext cx="3047501" cy="369332"/>
+          </a:xfrm>
+          <a:prstGeom prst="rect">
+            <a:avLst/>
+          </a:prstGeom>
+          <a:noFill/>
+        </p:spPr>
+        <p:txBody>
+          <a:bodyPr wrap="none" rtlCol="0">
+            <a:spAutoFit/>
+          </a:bodyPr>
+          <a:lstStyle/>
+          <a:p>
+            <a:r>
+              <a:rPr lang="fr-FR" dirty="0" smtClean="0"/>
+              <a:t>Renvoie sur la page Inscription</a:t>
+            </a:r>
+            <a:endParaRPr lang="fr-FR" dirty="0"/>
+          </a:p>
+        </p:txBody>
+      </p:sp>
+      <p:pic>
+        <p:nvPicPr>
+          <p:cNvPr id="16" name="Image 15" descr="Inscription.png"/>
+          <p:cNvPicPr>
+            <a:picLocks noChangeAspect="1"/>
+          </p:cNvPicPr>
+          <p:nvPr/>
+        </p:nvPicPr>
+        <p:blipFill>
+          <a:blip r:embed="rId3" cstate="print">
+            <a:lum/>
+          </a:blip>
+          <a:srcRect l="27862" t="1700" r="30608" b="6478"/>
+          <a:stretch>
+            <a:fillRect/>
+          </a:stretch>
+        </p:blipFill>
+        <p:spPr>
+          <a:xfrm>
+            <a:off x="683568" y="1825874"/>
+            <a:ext cx="1584176" cy="2251198"/>
+          </a:xfrm>
+          <a:prstGeom prst="rect">
+            <a:avLst/>
+          </a:prstGeom>
+          <a:ln w="38100" cap="sq">
+            <a:solidFill>
+              <a:srgbClr val="000000"/>
+            </a:solidFill>
+            <a:prstDash val="solid"/>
+            <a:miter lim="800000"/>
+          </a:ln>
+          <a:effectLst>
+            <a:outerShdw blurRad="50800" dist="38100" dir="2700000" algn="tl" rotWithShape="0">
+              <a:srgbClr val="000000">
+                <a:alpha val="43000"/>
+              </a:srgbClr>
+            </a:outerShdw>
+          </a:effectLst>
+        </p:spPr>
+      </p:pic>
+      <p:sp>
+        <p:nvSpPr>
+          <p:cNvPr id="17" name="ZoneTexte 16"/>
+          <p:cNvSpPr txBox="1"/>
+          <p:nvPr/>
+        </p:nvSpPr>
+        <p:spPr>
+          <a:xfrm>
+            <a:off x="6732240" y="2924944"/>
+            <a:ext cx="1689309" cy="646331"/>
+          </a:xfrm>
+          <a:prstGeom prst="rect">
+            <a:avLst/>
+          </a:prstGeom>
+          <a:noFill/>
+        </p:spPr>
+        <p:txBody>
+          <a:bodyPr wrap="none" rtlCol="0">
+            <a:spAutoFit/>
+          </a:bodyPr>
+          <a:lstStyle/>
+          <a:p>
+            <a:r>
+              <a:rPr lang="fr-FR" dirty="0" smtClean="0"/>
+              <a:t>Renvoie sur la </a:t>
+            </a:r>
+          </a:p>
+          <a:p>
+            <a:r>
+              <a:rPr lang="fr-FR" dirty="0" smtClean="0"/>
+              <a:t>page Connexion</a:t>
+            </a:r>
+            <a:endParaRPr lang="fr-FR" dirty="0"/>
+          </a:p>
+        </p:txBody>
+      </p:sp>
+      <p:cxnSp>
+        <p:nvCxnSpPr>
+          <p:cNvPr id="18" name="Connecteur droit avec flèche 17"/>
+          <p:cNvCxnSpPr>
+            <a:stCxn id="17" idx="1"/>
+          </p:cNvCxnSpPr>
+          <p:nvPr/>
+        </p:nvCxnSpPr>
+        <p:spPr>
+          <a:xfrm flipH="1">
+            <a:off x="5940152" y="3248110"/>
+            <a:ext cx="792088" cy="252898"/>
+          </a:xfrm>
+          <a:prstGeom prst="straightConnector1">
+            <a:avLst/>
+          </a:prstGeom>
+          <a:ln>
+            <a:tailEnd type="arrow"/>
+          </a:ln>
+        </p:spPr>
+        <p:style>
+          <a:lnRef idx="1">
+            <a:schemeClr val="dk1"/>
+          </a:lnRef>
+          <a:fillRef idx="0">
+            <a:schemeClr val="dk1"/>
+          </a:fillRef>
+          <a:effectRef idx="0">
+            <a:schemeClr val="dk1"/>
+          </a:effectRef>
+          <a:fontRef idx="minor">
+            <a:schemeClr val="tx1"/>
+          </a:fontRef>
+        </p:style>
+      </p:cxnSp>
+      <p:pic>
+        <p:nvPicPr>
+          <p:cNvPr id="19" name="Image 18" descr="Connection.png"/>
+          <p:cNvPicPr>
+            <a:picLocks noChangeAspect="1"/>
+          </p:cNvPicPr>
+          <p:nvPr/>
+        </p:nvPicPr>
+        <p:blipFill>
+          <a:blip r:embed="rId4" cstate="print">
+            <a:lum/>
+          </a:blip>
+          <a:srcRect l="28738" t="992" r="31100" b="7118"/>
+          <a:stretch>
+            <a:fillRect/>
+          </a:stretch>
+        </p:blipFill>
+        <p:spPr>
+          <a:xfrm>
+            <a:off x="6732240" y="3573016"/>
+            <a:ext cx="1762756" cy="2592288"/>
+          </a:xfrm>
+          <a:prstGeom prst="rect">
+            <a:avLst/>
+          </a:prstGeom>
+          <a:ln w="38100" cap="sq">
+            <a:solidFill>
+              <a:srgbClr val="000000"/>
+            </a:solidFill>
+            <a:prstDash val="solid"/>
+            <a:miter lim="800000"/>
+          </a:ln>
+          <a:effectLst>
+            <a:outerShdw blurRad="50800" dist="38100" dir="2700000" algn="tl" rotWithShape="0">
+              <a:srgbClr val="000000">
+                <a:alpha val="43000"/>
+              </a:srgbClr>
+            </a:outerShdw>
+          </a:effectLst>
+        </p:spPr>
+      </p:pic>
     </p:spTree>
   </p:cSld>
   <p:clrMapOvr>
@@ -3565,48 +4863,24 @@
           <a:chExt cx="0" cy="0"/>
         </a:xfrm>
       </p:grpSpPr>
-      <p:sp>
-        <p:nvSpPr>
-          <p:cNvPr id="2" name="Titre 1"/>
-          <p:cNvSpPr>
-            <a:spLocks noGrp="1"/>
-          </p:cNvSpPr>
-          <p:nvPr>
-            <p:ph type="title"/>
-          </p:nvPr>
-        </p:nvSpPr>
-        <p:spPr/>
-        <p:txBody>
-          <a:bodyPr/>
-          <a:lstStyle/>
-          <a:p>
-            <a:r>
-              <a:rPr lang="fr-FR" dirty="0" smtClean="0"/>
-              <a:t>Spécification du code</a:t>
-            </a:r>
-            <a:endParaRPr lang="fr-FR" dirty="0"/>
-          </a:p>
-        </p:txBody>
-      </p:sp>
       <p:pic>
         <p:nvPicPr>
-          <p:cNvPr id="1026" name="Picture 2"/>
+          <p:cNvPr id="4" name="Image 3" descr="Accueil site v2.png"/>
           <p:cNvPicPr>
-            <a:picLocks noChangeAspect="1" noChangeArrowheads="1"/>
+            <a:picLocks noChangeAspect="1"/>
           </p:cNvPicPr>
           <p:nvPr/>
         </p:nvPicPr>
         <p:blipFill>
           <a:blip r:embed="rId2" cstate="print"/>
-          <a:srcRect t="12685" b="2750"/>
           <a:stretch>
             <a:fillRect/>
           </a:stretch>
         </p:blipFill>
-        <p:spPr bwMode="auto">
+        <p:spPr>
           <a:xfrm>
-            <a:off x="0" y="1772816"/>
-            <a:ext cx="9087222" cy="4320480"/>
+            <a:off x="539552" y="620688"/>
+            <a:ext cx="7932955" cy="5098873"/>
           </a:xfrm>
           <a:prstGeom prst="rect">
             <a:avLst/>
@@ -3627,6 +4901,498 @@
           </a:effectLst>
         </p:spPr>
       </p:pic>
+      <p:sp>
+        <p:nvSpPr>
+          <p:cNvPr id="5" name="Rectangle 4"/>
+          <p:cNvSpPr/>
+          <p:nvPr/>
+        </p:nvSpPr>
+        <p:spPr>
+          <a:xfrm>
+            <a:off x="899592" y="6165304"/>
+            <a:ext cx="648072" cy="288032"/>
+          </a:xfrm>
+          <a:prstGeom prst="rect">
+            <a:avLst/>
+          </a:prstGeom>
+          <a:solidFill>
+            <a:srgbClr val="00B050"/>
+          </a:solidFill>
+          <a:ln>
+            <a:solidFill>
+              <a:schemeClr val="tx1"/>
+            </a:solidFill>
+          </a:ln>
+        </p:spPr>
+        <p:style>
+          <a:lnRef idx="3">
+            <a:schemeClr val="lt1"/>
+          </a:lnRef>
+          <a:fillRef idx="1">
+            <a:schemeClr val="accent3"/>
+          </a:fillRef>
+          <a:effectRef idx="1">
+            <a:schemeClr val="accent3"/>
+          </a:effectRef>
+          <a:fontRef idx="minor">
+            <a:schemeClr val="lt1"/>
+          </a:fontRef>
+        </p:style>
+        <p:txBody>
+          <a:bodyPr rtlCol="0" anchor="ctr"/>
+          <a:lstStyle/>
+          <a:p>
+            <a:pPr algn="ctr"/>
+            <a:endParaRPr lang="fr-FR" dirty="0"/>
+          </a:p>
+        </p:txBody>
+      </p:sp>
+      <p:sp>
+        <p:nvSpPr>
+          <p:cNvPr id="6" name="ZoneTexte 5"/>
+          <p:cNvSpPr txBox="1"/>
+          <p:nvPr/>
+        </p:nvSpPr>
+        <p:spPr>
+          <a:xfrm>
+            <a:off x="1547664" y="6093296"/>
+            <a:ext cx="875240" cy="369332"/>
+          </a:xfrm>
+          <a:prstGeom prst="rect">
+            <a:avLst/>
+          </a:prstGeom>
+          <a:noFill/>
+        </p:spPr>
+        <p:txBody>
+          <a:bodyPr wrap="none" rtlCol="0">
+            <a:spAutoFit/>
+          </a:bodyPr>
+          <a:lstStyle/>
+          <a:p>
+            <a:r>
+              <a:rPr lang="fr-FR" dirty="0" smtClean="0"/>
+              <a:t>: Image</a:t>
+            </a:r>
+            <a:endParaRPr lang="fr-FR" dirty="0"/>
+          </a:p>
+        </p:txBody>
+      </p:sp>
+      <p:sp>
+        <p:nvSpPr>
+          <p:cNvPr id="7" name="Rectangle 6"/>
+          <p:cNvSpPr/>
+          <p:nvPr/>
+        </p:nvSpPr>
+        <p:spPr>
+          <a:xfrm>
+            <a:off x="3563888" y="6165304"/>
+            <a:ext cx="648072" cy="288032"/>
+          </a:xfrm>
+          <a:prstGeom prst="rect">
+            <a:avLst/>
+          </a:prstGeom>
+          <a:solidFill>
+            <a:srgbClr val="FF0000"/>
+          </a:solidFill>
+          <a:ln>
+            <a:solidFill>
+              <a:schemeClr val="tx1"/>
+            </a:solidFill>
+          </a:ln>
+        </p:spPr>
+        <p:style>
+          <a:lnRef idx="3">
+            <a:schemeClr val="lt1"/>
+          </a:lnRef>
+          <a:fillRef idx="1">
+            <a:schemeClr val="accent3"/>
+          </a:fillRef>
+          <a:effectRef idx="1">
+            <a:schemeClr val="accent3"/>
+          </a:effectRef>
+          <a:fontRef idx="minor">
+            <a:schemeClr val="lt1"/>
+          </a:fontRef>
+        </p:style>
+        <p:txBody>
+          <a:bodyPr rtlCol="0" anchor="ctr"/>
+          <a:lstStyle/>
+          <a:p>
+            <a:pPr algn="ctr"/>
+            <a:endParaRPr lang="fr-FR" dirty="0"/>
+          </a:p>
+        </p:txBody>
+      </p:sp>
+      <p:sp>
+        <p:nvSpPr>
+          <p:cNvPr id="8" name="Rectangle 7"/>
+          <p:cNvSpPr/>
+          <p:nvPr/>
+        </p:nvSpPr>
+        <p:spPr>
+          <a:xfrm>
+            <a:off x="5940152" y="6165304"/>
+            <a:ext cx="648072" cy="288032"/>
+          </a:xfrm>
+          <a:prstGeom prst="rect">
+            <a:avLst/>
+          </a:prstGeom>
+          <a:solidFill>
+            <a:srgbClr val="00B0F0"/>
+          </a:solidFill>
+          <a:ln>
+            <a:solidFill>
+              <a:schemeClr val="tx1"/>
+            </a:solidFill>
+          </a:ln>
+        </p:spPr>
+        <p:style>
+          <a:lnRef idx="3">
+            <a:schemeClr val="lt1"/>
+          </a:lnRef>
+          <a:fillRef idx="1">
+            <a:schemeClr val="accent3"/>
+          </a:fillRef>
+          <a:effectRef idx="1">
+            <a:schemeClr val="accent3"/>
+          </a:effectRef>
+          <a:fontRef idx="minor">
+            <a:schemeClr val="lt1"/>
+          </a:fontRef>
+        </p:style>
+        <p:txBody>
+          <a:bodyPr rtlCol="0" anchor="ctr"/>
+          <a:lstStyle/>
+          <a:p>
+            <a:pPr algn="ctr"/>
+            <a:endParaRPr lang="fr-FR" dirty="0"/>
+          </a:p>
+        </p:txBody>
+      </p:sp>
+      <p:sp>
+        <p:nvSpPr>
+          <p:cNvPr id="9" name="ZoneTexte 8"/>
+          <p:cNvSpPr txBox="1"/>
+          <p:nvPr/>
+        </p:nvSpPr>
+        <p:spPr>
+          <a:xfrm>
+            <a:off x="4211960" y="6093296"/>
+            <a:ext cx="987130" cy="369332"/>
+          </a:xfrm>
+          <a:prstGeom prst="rect">
+            <a:avLst/>
+          </a:prstGeom>
+          <a:noFill/>
+        </p:spPr>
+        <p:txBody>
+          <a:bodyPr wrap="none" rtlCol="0">
+            <a:spAutoFit/>
+          </a:bodyPr>
+          <a:lstStyle/>
+          <a:p>
+            <a:r>
+              <a:rPr lang="fr-FR" dirty="0" smtClean="0"/>
+              <a:t>: Bouton</a:t>
+            </a:r>
+            <a:endParaRPr lang="fr-FR" dirty="0"/>
+          </a:p>
+        </p:txBody>
+      </p:sp>
+      <p:sp>
+        <p:nvSpPr>
+          <p:cNvPr id="10" name="ZoneTexte 9"/>
+          <p:cNvSpPr txBox="1"/>
+          <p:nvPr/>
+        </p:nvSpPr>
+        <p:spPr>
+          <a:xfrm>
+            <a:off x="6588224" y="6093296"/>
+            <a:ext cx="1582677" cy="369332"/>
+          </a:xfrm>
+          <a:prstGeom prst="rect">
+            <a:avLst/>
+          </a:prstGeom>
+          <a:noFill/>
+        </p:spPr>
+        <p:txBody>
+          <a:bodyPr wrap="none" rtlCol="0">
+            <a:spAutoFit/>
+          </a:bodyPr>
+          <a:lstStyle/>
+          <a:p>
+            <a:r>
+              <a:rPr lang="fr-FR" dirty="0" smtClean="0"/>
+              <a:t>: Zone de texte</a:t>
+            </a:r>
+            <a:endParaRPr lang="fr-FR" dirty="0"/>
+          </a:p>
+        </p:txBody>
+      </p:sp>
+      <p:cxnSp>
+        <p:nvCxnSpPr>
+          <p:cNvPr id="11" name="Connecteur droit avec flèche 10"/>
+          <p:cNvCxnSpPr/>
+          <p:nvPr/>
+        </p:nvCxnSpPr>
+        <p:spPr>
+          <a:xfrm flipH="1">
+            <a:off x="1043608" y="332656"/>
+            <a:ext cx="1584176" cy="432048"/>
+          </a:xfrm>
+          <a:prstGeom prst="straightConnector1">
+            <a:avLst/>
+          </a:prstGeom>
+          <a:ln>
+            <a:tailEnd type="arrow"/>
+          </a:ln>
+        </p:spPr>
+        <p:style>
+          <a:lnRef idx="1">
+            <a:schemeClr val="dk1"/>
+          </a:lnRef>
+          <a:fillRef idx="0">
+            <a:schemeClr val="dk1"/>
+          </a:fillRef>
+          <a:effectRef idx="0">
+            <a:schemeClr val="dk1"/>
+          </a:effectRef>
+          <a:fontRef idx="minor">
+            <a:schemeClr val="tx1"/>
+          </a:fontRef>
+        </p:style>
+      </p:cxnSp>
+      <p:cxnSp>
+        <p:nvCxnSpPr>
+          <p:cNvPr id="12" name="Connecteur droit avec flèche 11"/>
+          <p:cNvCxnSpPr/>
+          <p:nvPr/>
+        </p:nvCxnSpPr>
+        <p:spPr>
+          <a:xfrm flipH="1">
+            <a:off x="2051720" y="332656"/>
+            <a:ext cx="936104" cy="432048"/>
+          </a:xfrm>
+          <a:prstGeom prst="straightConnector1">
+            <a:avLst/>
+          </a:prstGeom>
+          <a:ln>
+            <a:tailEnd type="arrow"/>
+          </a:ln>
+        </p:spPr>
+        <p:style>
+          <a:lnRef idx="1">
+            <a:schemeClr val="dk1"/>
+          </a:lnRef>
+          <a:fillRef idx="0">
+            <a:schemeClr val="dk1"/>
+          </a:fillRef>
+          <a:effectRef idx="0">
+            <a:schemeClr val="dk1"/>
+          </a:effectRef>
+          <a:fontRef idx="minor">
+            <a:schemeClr val="tx1"/>
+          </a:fontRef>
+        </p:style>
+      </p:cxnSp>
+      <p:cxnSp>
+        <p:nvCxnSpPr>
+          <p:cNvPr id="13" name="Connecteur droit avec flèche 12"/>
+          <p:cNvCxnSpPr/>
+          <p:nvPr/>
+        </p:nvCxnSpPr>
+        <p:spPr>
+          <a:xfrm flipH="1">
+            <a:off x="2915816" y="332656"/>
+            <a:ext cx="504056" cy="432048"/>
+          </a:xfrm>
+          <a:prstGeom prst="straightConnector1">
+            <a:avLst/>
+          </a:prstGeom>
+          <a:ln>
+            <a:tailEnd type="arrow"/>
+          </a:ln>
+        </p:spPr>
+        <p:style>
+          <a:lnRef idx="1">
+            <a:schemeClr val="dk1"/>
+          </a:lnRef>
+          <a:fillRef idx="0">
+            <a:schemeClr val="dk1"/>
+          </a:fillRef>
+          <a:effectRef idx="0">
+            <a:schemeClr val="dk1"/>
+          </a:effectRef>
+          <a:fontRef idx="minor">
+            <a:schemeClr val="tx1"/>
+          </a:fontRef>
+        </p:style>
+      </p:cxnSp>
+      <p:cxnSp>
+        <p:nvCxnSpPr>
+          <p:cNvPr id="14" name="Connecteur droit avec flèche 13"/>
+          <p:cNvCxnSpPr/>
+          <p:nvPr/>
+        </p:nvCxnSpPr>
+        <p:spPr>
+          <a:xfrm>
+            <a:off x="5364088" y="332656"/>
+            <a:ext cx="504056" cy="432048"/>
+          </a:xfrm>
+          <a:prstGeom prst="straightConnector1">
+            <a:avLst/>
+          </a:prstGeom>
+          <a:ln>
+            <a:tailEnd type="arrow"/>
+          </a:ln>
+        </p:spPr>
+        <p:style>
+          <a:lnRef idx="1">
+            <a:schemeClr val="dk1"/>
+          </a:lnRef>
+          <a:fillRef idx="0">
+            <a:schemeClr val="dk1"/>
+          </a:fillRef>
+          <a:effectRef idx="0">
+            <a:schemeClr val="dk1"/>
+          </a:effectRef>
+          <a:fontRef idx="minor">
+            <a:schemeClr val="tx1"/>
+          </a:fontRef>
+        </p:style>
+      </p:cxnSp>
+      <p:cxnSp>
+        <p:nvCxnSpPr>
+          <p:cNvPr id="15" name="Connecteur droit avec flèche 14"/>
+          <p:cNvCxnSpPr/>
+          <p:nvPr/>
+        </p:nvCxnSpPr>
+        <p:spPr>
+          <a:xfrm>
+            <a:off x="5796136" y="332656"/>
+            <a:ext cx="1152128" cy="504056"/>
+          </a:xfrm>
+          <a:prstGeom prst="straightConnector1">
+            <a:avLst/>
+          </a:prstGeom>
+          <a:ln>
+            <a:tailEnd type="arrow"/>
+          </a:ln>
+        </p:spPr>
+        <p:style>
+          <a:lnRef idx="1">
+            <a:schemeClr val="dk1"/>
+          </a:lnRef>
+          <a:fillRef idx="0">
+            <a:schemeClr val="dk1"/>
+          </a:fillRef>
+          <a:effectRef idx="0">
+            <a:schemeClr val="dk1"/>
+          </a:effectRef>
+          <a:fontRef idx="minor">
+            <a:schemeClr val="tx1"/>
+          </a:fontRef>
+        </p:style>
+      </p:cxnSp>
+      <p:cxnSp>
+        <p:nvCxnSpPr>
+          <p:cNvPr id="16" name="Connecteur droit avec flèche 15"/>
+          <p:cNvCxnSpPr/>
+          <p:nvPr/>
+        </p:nvCxnSpPr>
+        <p:spPr>
+          <a:xfrm flipH="1">
+            <a:off x="8172400" y="548680"/>
+            <a:ext cx="504056" cy="288032"/>
+          </a:xfrm>
+          <a:prstGeom prst="straightConnector1">
+            <a:avLst/>
+          </a:prstGeom>
+          <a:ln>
+            <a:tailEnd type="arrow"/>
+          </a:ln>
+        </p:spPr>
+        <p:style>
+          <a:lnRef idx="1">
+            <a:schemeClr val="dk1"/>
+          </a:lnRef>
+          <a:fillRef idx="0">
+            <a:schemeClr val="dk1"/>
+          </a:fillRef>
+          <a:effectRef idx="0">
+            <a:schemeClr val="dk1"/>
+          </a:effectRef>
+          <a:fontRef idx="minor">
+            <a:schemeClr val="tx1"/>
+          </a:fontRef>
+        </p:style>
+      </p:cxnSp>
+      <p:sp>
+        <p:nvSpPr>
+          <p:cNvPr id="17" name="ZoneTexte 16"/>
+          <p:cNvSpPr txBox="1"/>
+          <p:nvPr/>
+        </p:nvSpPr>
+        <p:spPr>
+          <a:xfrm>
+            <a:off x="2483768" y="0"/>
+            <a:ext cx="3874650" cy="369332"/>
+          </a:xfrm>
+          <a:prstGeom prst="rect">
+            <a:avLst/>
+          </a:prstGeom>
+          <a:noFill/>
+        </p:spPr>
+        <p:txBody>
+          <a:bodyPr wrap="none" rtlCol="0">
+            <a:spAutoFit/>
+          </a:bodyPr>
+          <a:lstStyle/>
+          <a:p>
+            <a:r>
+              <a:rPr lang="fr-FR" dirty="0" smtClean="0"/>
+              <a:t>Permet d’accéder aux différentes pages</a:t>
+            </a:r>
+            <a:endParaRPr lang="fr-FR" dirty="0"/>
+          </a:p>
+        </p:txBody>
+      </p:sp>
+      <p:sp>
+        <p:nvSpPr>
+          <p:cNvPr id="18" name="ZoneTexte 17"/>
+          <p:cNvSpPr txBox="1"/>
+          <p:nvPr/>
+        </p:nvSpPr>
+        <p:spPr>
+          <a:xfrm>
+            <a:off x="6899218" y="0"/>
+            <a:ext cx="2244782" cy="584775"/>
+          </a:xfrm>
+          <a:prstGeom prst="rect">
+            <a:avLst/>
+          </a:prstGeom>
+          <a:noFill/>
+        </p:spPr>
+        <p:txBody>
+          <a:bodyPr wrap="none" rtlCol="0">
+            <a:spAutoFit/>
+          </a:bodyPr>
+          <a:lstStyle/>
+          <a:p>
+            <a:r>
+              <a:rPr lang="fr-FR" sz="1600" dirty="0" smtClean="0"/>
+              <a:t>Active un onglet avec </a:t>
+            </a:r>
+          </a:p>
+          <a:p>
+            <a:r>
+              <a:rPr lang="fr-FR" sz="1600" dirty="0" smtClean="0"/>
+              <a:t>‘Profil’ et ‘Déconnection’</a:t>
+            </a:r>
+            <a:endParaRPr lang="fr-FR" sz="1600" dirty="0"/>
+          </a:p>
+        </p:txBody>
+      </p:sp>
     </p:spTree>
   </p:cSld>
   <p:clrMapOvr>
@@ -3668,36 +5434,229 @@
           <a:lstStyle/>
           <a:p>
             <a:r>
+              <a:rPr lang="fr-FR" b="1" u="sng" dirty="0" smtClean="0">
+                <a:solidFill>
+                  <a:srgbClr val="FF0000"/>
+                </a:solidFill>
+              </a:rPr>
+              <a:t>Spécification du code</a:t>
+            </a:r>
+            <a:endParaRPr lang="fr-FR" b="1" u="sng" dirty="0">
+              <a:solidFill>
+                <a:srgbClr val="FF0000"/>
+              </a:solidFill>
+            </a:endParaRPr>
+          </a:p>
+        </p:txBody>
+      </p:sp>
+      <p:pic>
+        <p:nvPicPr>
+          <p:cNvPr id="1026" name="Picture 2"/>
+          <p:cNvPicPr>
+            <a:picLocks noChangeAspect="1" noChangeArrowheads="1"/>
+          </p:cNvPicPr>
+          <p:nvPr/>
+        </p:nvPicPr>
+        <p:blipFill>
+          <a:blip r:embed="rId2" cstate="print"/>
+          <a:srcRect t="12685" b="2750"/>
+          <a:stretch>
+            <a:fillRect/>
+          </a:stretch>
+        </p:blipFill>
+        <p:spPr bwMode="auto">
+          <a:xfrm>
+            <a:off x="0" y="1700808"/>
+            <a:ext cx="9087222" cy="4320480"/>
+          </a:xfrm>
+          <a:prstGeom prst="rect">
+            <a:avLst/>
+          </a:prstGeom>
+          <a:ln w="38100" cap="sq">
+            <a:solidFill>
+              <a:srgbClr val="000000"/>
+            </a:solidFill>
+            <a:prstDash val="solid"/>
+            <a:miter lim="800000"/>
+          </a:ln>
+          <a:effectLst>
+            <a:outerShdw blurRad="50800" dist="38100" dir="2700000" algn="tl" rotWithShape="0">
+              <a:srgbClr val="000000">
+                <a:alpha val="43000"/>
+              </a:srgbClr>
+            </a:outerShdw>
+          </a:effectLst>
+        </p:spPr>
+      </p:pic>
+      <p:sp>
+        <p:nvSpPr>
+          <p:cNvPr id="4" name="ZoneTexte 3"/>
+          <p:cNvSpPr txBox="1"/>
+          <p:nvPr/>
+        </p:nvSpPr>
+        <p:spPr>
+          <a:xfrm>
+            <a:off x="395536" y="5229200"/>
+            <a:ext cx="3508589" cy="369332"/>
+          </a:xfrm>
+          <a:prstGeom prst="rect">
+            <a:avLst/>
+          </a:prstGeom>
+          <a:noFill/>
+        </p:spPr>
+        <p:txBody>
+          <a:bodyPr wrap="none" rtlCol="0">
+            <a:spAutoFit/>
+          </a:bodyPr>
+          <a:lstStyle/>
+          <a:p>
+            <a:r>
               <a:rPr lang="fr-FR" dirty="0" err="1" smtClean="0"/>
-              <a:t>Versonning</a:t>
+              <a:t>Boostrap</a:t>
             </a:r>
             <a:r>
               <a:rPr lang="fr-FR" dirty="0" smtClean="0"/>
-              <a:t> GIT</a:t>
+              <a:t> pour faire la mise en page</a:t>
             </a:r>
             <a:endParaRPr lang="fr-FR" dirty="0"/>
           </a:p>
         </p:txBody>
       </p:sp>
-      <p:sp>
-        <p:nvSpPr>
-          <p:cNvPr id="3" name="Espace réservé du contenu 2"/>
-          <p:cNvSpPr>
-            <a:spLocks noGrp="1"/>
-          </p:cNvSpPr>
-          <p:nvPr>
-            <p:ph idx="1"/>
-          </p:nvPr>
-        </p:nvSpPr>
-        <p:spPr/>
-        <p:txBody>
-          <a:bodyPr/>
-          <a:lstStyle/>
-          <a:p>
-            <a:endParaRPr lang="fr-FR"/>
-          </a:p>
-        </p:txBody>
-      </p:sp>
+      <p:cxnSp>
+        <p:nvCxnSpPr>
+          <p:cNvPr id="6" name="Connecteur droit avec flèche 5"/>
+          <p:cNvCxnSpPr>
+            <a:stCxn id="4" idx="0"/>
+          </p:cNvCxnSpPr>
+          <p:nvPr/>
+        </p:nvCxnSpPr>
+        <p:spPr>
+          <a:xfrm flipV="1">
+            <a:off x="2149831" y="3717032"/>
+            <a:ext cx="405945" cy="1512168"/>
+          </a:xfrm>
+          <a:prstGeom prst="straightConnector1">
+            <a:avLst/>
+          </a:prstGeom>
+          <a:ln>
+            <a:tailEnd type="arrow"/>
+          </a:ln>
+        </p:spPr>
+        <p:style>
+          <a:lnRef idx="1">
+            <a:schemeClr val="dk1"/>
+          </a:lnRef>
+          <a:fillRef idx="0">
+            <a:schemeClr val="dk1"/>
+          </a:fillRef>
+          <a:effectRef idx="0">
+            <a:schemeClr val="dk1"/>
+          </a:effectRef>
+          <a:fontRef idx="minor">
+            <a:schemeClr val="tx1"/>
+          </a:fontRef>
+        </p:style>
+      </p:cxnSp>
+      <p:sp>
+        <p:nvSpPr>
+          <p:cNvPr id="8" name="ZoneTexte 7"/>
+          <p:cNvSpPr txBox="1"/>
+          <p:nvPr/>
+        </p:nvSpPr>
+        <p:spPr>
+          <a:xfrm>
+            <a:off x="4572000" y="5301208"/>
+            <a:ext cx="871713" cy="369332"/>
+          </a:xfrm>
+          <a:prstGeom prst="rect">
+            <a:avLst/>
+          </a:prstGeom>
+          <a:noFill/>
+        </p:spPr>
+        <p:txBody>
+          <a:bodyPr wrap="none" rtlCol="0">
+            <a:spAutoFit/>
+          </a:bodyPr>
+          <a:lstStyle/>
+          <a:p>
+            <a:r>
+              <a:rPr lang="fr-FR" dirty="0" smtClean="0"/>
+              <a:t>Bouton</a:t>
+            </a:r>
+            <a:endParaRPr lang="fr-FR" dirty="0"/>
+          </a:p>
+        </p:txBody>
+      </p:sp>
+      <p:cxnSp>
+        <p:nvCxnSpPr>
+          <p:cNvPr id="10" name="Connecteur droit avec flèche 9"/>
+          <p:cNvCxnSpPr>
+            <a:stCxn id="8" idx="0"/>
+          </p:cNvCxnSpPr>
+          <p:nvPr/>
+        </p:nvCxnSpPr>
+        <p:spPr>
+          <a:xfrm flipV="1">
+            <a:off x="5007857" y="4581128"/>
+            <a:ext cx="356231" cy="720080"/>
+          </a:xfrm>
+          <a:prstGeom prst="straightConnector1">
+            <a:avLst/>
+          </a:prstGeom>
+          <a:ln>
+            <a:tailEnd type="arrow"/>
+          </a:ln>
+        </p:spPr>
+        <p:style>
+          <a:lnRef idx="1">
+            <a:schemeClr val="dk1"/>
+          </a:lnRef>
+          <a:fillRef idx="0">
+            <a:schemeClr val="dk1"/>
+          </a:fillRef>
+          <a:effectRef idx="0">
+            <a:schemeClr val="dk1"/>
+          </a:effectRef>
+          <a:fontRef idx="minor">
+            <a:schemeClr val="tx1"/>
+          </a:fontRef>
+        </p:style>
+      </p:cxnSp>
+      <p:cxnSp>
+        <p:nvCxnSpPr>
+          <p:cNvPr id="12" name="Connecteur droit avec flèche 11"/>
+          <p:cNvCxnSpPr>
+            <a:stCxn id="8" idx="0"/>
+          </p:cNvCxnSpPr>
+          <p:nvPr/>
+        </p:nvCxnSpPr>
+        <p:spPr>
+          <a:xfrm flipH="1" flipV="1">
+            <a:off x="3923928" y="4653136"/>
+            <a:ext cx="1083929" cy="648072"/>
+          </a:xfrm>
+          <a:prstGeom prst="straightConnector1">
+            <a:avLst/>
+          </a:prstGeom>
+          <a:ln>
+            <a:tailEnd type="arrow"/>
+          </a:ln>
+        </p:spPr>
+        <p:style>
+          <a:lnRef idx="1">
+            <a:schemeClr val="dk1"/>
+          </a:lnRef>
+          <a:fillRef idx="0">
+            <a:schemeClr val="dk1"/>
+          </a:fillRef>
+          <a:effectRef idx="0">
+            <a:schemeClr val="dk1"/>
+          </a:effectRef>
+          <a:fontRef idx="minor">
+            <a:schemeClr val="tx1"/>
+          </a:fontRef>
+        </p:style>
+      </p:cxnSp>
     </p:spTree>
   </p:cSld>
   <p:clrMapOvr>
@@ -3723,48 +5682,245 @@
           <a:chExt cx="0" cy="0"/>
         </a:xfrm>
       </p:grpSpPr>
-      <p:sp>
-        <p:nvSpPr>
-          <p:cNvPr id="2" name="Titre 1"/>
-          <p:cNvSpPr>
-            <a:spLocks noGrp="1"/>
-          </p:cNvSpPr>
-          <p:nvPr>
-            <p:ph type="title"/>
-          </p:nvPr>
-        </p:nvSpPr>
-        <p:spPr/>
-        <p:txBody>
-          <a:bodyPr/>
+      <p:pic>
+        <p:nvPicPr>
+          <p:cNvPr id="26626" name="Picture 2"/>
+          <p:cNvPicPr>
+            <a:picLocks noChangeAspect="1" noChangeArrowheads="1"/>
+          </p:cNvPicPr>
+          <p:nvPr/>
+        </p:nvPicPr>
+        <p:blipFill>
+          <a:blip r:embed="rId2" cstate="print"/>
+          <a:srcRect/>
+          <a:stretch>
+            <a:fillRect/>
+          </a:stretch>
+        </p:blipFill>
+        <p:spPr bwMode="auto">
+          <a:xfrm>
+            <a:off x="-714" y="1340768"/>
+            <a:ext cx="9144714" cy="4234036"/>
+          </a:xfrm>
+          <a:prstGeom prst="rect">
+            <a:avLst/>
+          </a:prstGeom>
+          <a:ln w="38100" cap="sq">
+            <a:solidFill>
+              <a:srgbClr val="000000"/>
+            </a:solidFill>
+            <a:prstDash val="solid"/>
+            <a:miter lim="800000"/>
+          </a:ln>
+          <a:effectLst>
+            <a:outerShdw blurRad="50800" dist="38100" dir="2700000" algn="tl" rotWithShape="0">
+              <a:srgbClr val="000000">
+                <a:alpha val="43000"/>
+              </a:srgbClr>
+            </a:outerShdw>
+          </a:effectLst>
+        </p:spPr>
+      </p:pic>
+      <p:sp>
+        <p:nvSpPr>
+          <p:cNvPr id="5" name="ZoneTexte 4"/>
+          <p:cNvSpPr txBox="1"/>
+          <p:nvPr/>
+        </p:nvSpPr>
+        <p:spPr>
+          <a:xfrm>
+            <a:off x="3635896" y="404664"/>
+            <a:ext cx="871713" cy="369332"/>
+          </a:xfrm>
+          <a:prstGeom prst="rect">
+            <a:avLst/>
+          </a:prstGeom>
+          <a:noFill/>
+        </p:spPr>
+        <p:txBody>
+          <a:bodyPr wrap="none" rtlCol="0">
+            <a:spAutoFit/>
+          </a:bodyPr>
           <a:lstStyle/>
           <a:p>
             <a:r>
               <a:rPr lang="fr-FR" dirty="0" smtClean="0"/>
-              <a:t>Bilan personnel Albéric</a:t>
+              <a:t>Bouton</a:t>
             </a:r>
             <a:endParaRPr lang="fr-FR" dirty="0"/>
           </a:p>
         </p:txBody>
       </p:sp>
-      <p:sp>
-        <p:nvSpPr>
-          <p:cNvPr id="3" name="Espace réservé du contenu 2"/>
-          <p:cNvSpPr>
-            <a:spLocks noGrp="1"/>
-          </p:cNvSpPr>
-          <p:nvPr>
-            <p:ph idx="1"/>
-          </p:nvPr>
-        </p:nvSpPr>
-        <p:spPr/>
-        <p:txBody>
-          <a:bodyPr/>
-          <a:lstStyle/>
-          <a:p>
+      <p:cxnSp>
+        <p:nvCxnSpPr>
+          <p:cNvPr id="7" name="Connecteur droit avec flèche 6"/>
+          <p:cNvCxnSpPr>
+            <a:stCxn id="5" idx="2"/>
+          </p:cNvCxnSpPr>
+          <p:nvPr/>
+        </p:nvCxnSpPr>
+        <p:spPr>
+          <a:xfrm flipH="1">
+            <a:off x="1835696" y="773996"/>
+            <a:ext cx="2236057" cy="854804"/>
+          </a:xfrm>
+          <a:prstGeom prst="straightConnector1">
+            <a:avLst/>
+          </a:prstGeom>
+          <a:ln>
+            <a:tailEnd type="arrow"/>
+          </a:ln>
+        </p:spPr>
+        <p:style>
+          <a:lnRef idx="1">
+            <a:schemeClr val="dk1"/>
+          </a:lnRef>
+          <a:fillRef idx="0">
+            <a:schemeClr val="dk1"/>
+          </a:fillRef>
+          <a:effectRef idx="0">
+            <a:schemeClr val="dk1"/>
+          </a:effectRef>
+          <a:fontRef idx="minor">
+            <a:schemeClr val="tx1"/>
+          </a:fontRef>
+        </p:style>
+      </p:cxnSp>
+      <p:cxnSp>
+        <p:nvCxnSpPr>
+          <p:cNvPr id="9" name="Connecteur droit avec flèche 8"/>
+          <p:cNvCxnSpPr>
+            <a:stCxn id="5" idx="2"/>
+          </p:cNvCxnSpPr>
+          <p:nvPr/>
+        </p:nvCxnSpPr>
+        <p:spPr>
+          <a:xfrm>
+            <a:off x="4071753" y="773996"/>
+            <a:ext cx="2228439" cy="998820"/>
+          </a:xfrm>
+          <a:prstGeom prst="straightConnector1">
+            <a:avLst/>
+          </a:prstGeom>
+          <a:ln>
+            <a:tailEnd type="arrow"/>
+          </a:ln>
+        </p:spPr>
+        <p:style>
+          <a:lnRef idx="1">
+            <a:schemeClr val="dk1"/>
+          </a:lnRef>
+          <a:fillRef idx="0">
+            <a:schemeClr val="dk1"/>
+          </a:fillRef>
+          <a:effectRef idx="0">
+            <a:schemeClr val="dk1"/>
+          </a:effectRef>
+          <a:fontRef idx="minor">
+            <a:schemeClr val="tx1"/>
+          </a:fontRef>
+        </p:style>
+      </p:cxnSp>
+      <p:sp>
+        <p:nvSpPr>
+          <p:cNvPr id="10" name="ZoneTexte 9"/>
+          <p:cNvSpPr txBox="1"/>
+          <p:nvPr/>
+        </p:nvSpPr>
+        <p:spPr>
+          <a:xfrm>
+            <a:off x="2555776" y="4077072"/>
+            <a:ext cx="2557495" cy="369332"/>
+          </a:xfrm>
+          <a:prstGeom prst="rect">
+            <a:avLst/>
+          </a:prstGeom>
+          <a:noFill/>
+        </p:spPr>
+        <p:txBody>
+          <a:bodyPr wrap="none" rtlCol="0">
+            <a:spAutoFit/>
+          </a:bodyPr>
+          <a:lstStyle/>
+          <a:p>
+            <a:r>
+              <a:rPr lang="fr-FR" dirty="0" smtClean="0"/>
+              <a:t>Zone de texte pour écrire</a:t>
+            </a:r>
             <a:endParaRPr lang="fr-FR" dirty="0"/>
           </a:p>
         </p:txBody>
       </p:sp>
+      <p:cxnSp>
+        <p:nvCxnSpPr>
+          <p:cNvPr id="12" name="Connecteur droit avec flèche 11"/>
+          <p:cNvCxnSpPr>
+            <a:stCxn id="10" idx="0"/>
+          </p:cNvCxnSpPr>
+          <p:nvPr/>
+        </p:nvCxnSpPr>
+        <p:spPr>
+          <a:xfrm flipH="1" flipV="1">
+            <a:off x="1187624" y="3789040"/>
+            <a:ext cx="2646900" cy="288032"/>
+          </a:xfrm>
+          <a:prstGeom prst="straightConnector1">
+            <a:avLst/>
+          </a:prstGeom>
+          <a:ln>
+            <a:tailEnd type="arrow"/>
+          </a:ln>
+        </p:spPr>
+        <p:style>
+          <a:lnRef idx="1">
+            <a:schemeClr val="dk1"/>
+          </a:lnRef>
+          <a:fillRef idx="0">
+            <a:schemeClr val="dk1"/>
+          </a:fillRef>
+          <a:effectRef idx="0">
+            <a:schemeClr val="dk1"/>
+          </a:effectRef>
+          <a:fontRef idx="minor">
+            <a:schemeClr val="tx1"/>
+          </a:fontRef>
+        </p:style>
+      </p:cxnSp>
+      <p:cxnSp>
+        <p:nvCxnSpPr>
+          <p:cNvPr id="16" name="Connecteur droit avec flèche 15"/>
+          <p:cNvCxnSpPr>
+            <a:stCxn id="10" idx="0"/>
+          </p:cNvCxnSpPr>
+          <p:nvPr/>
+        </p:nvCxnSpPr>
+        <p:spPr>
+          <a:xfrm flipV="1">
+            <a:off x="3834524" y="1916832"/>
+            <a:ext cx="809484" cy="2160240"/>
+          </a:xfrm>
+          <a:prstGeom prst="straightConnector1">
+            <a:avLst/>
+          </a:prstGeom>
+          <a:ln>
+            <a:tailEnd type="arrow"/>
+          </a:ln>
+        </p:spPr>
+        <p:style>
+          <a:lnRef idx="1">
+            <a:schemeClr val="dk1"/>
+          </a:lnRef>
+          <a:fillRef idx="0">
+            <a:schemeClr val="dk1"/>
+          </a:fillRef>
+          <a:effectRef idx="0">
+            <a:schemeClr val="dk1"/>
+          </a:effectRef>
+          <a:fontRef idx="minor">
+            <a:schemeClr val="tx1"/>
+          </a:fontRef>
+        </p:style>
+      </p:cxnSp>
     </p:spTree>
   </p:cSld>
   <p:clrMapOvr>
@@ -3790,24 +5946,70 @@
           <a:chExt cx="0" cy="0"/>
         </a:xfrm>
       </p:grpSpPr>
-      <p:sp>
-        <p:nvSpPr>
-          <p:cNvPr id="2" name="Titre 1"/>
-          <p:cNvSpPr>
-            <a:spLocks noGrp="1"/>
-          </p:cNvSpPr>
-          <p:nvPr>
-            <p:ph type="title"/>
-          </p:nvPr>
-        </p:nvSpPr>
-        <p:spPr/>
-        <p:txBody>
-          <a:bodyPr/>
+      <p:pic>
+        <p:nvPicPr>
+          <p:cNvPr id="1026" name="Picture 2" descr="https://cdn.discordapp.com/attachments/423920462012350475/442411956910030868/unknown.png"/>
+          <p:cNvPicPr>
+            <a:picLocks noChangeAspect="1" noChangeArrowheads="1"/>
+          </p:cNvPicPr>
+          <p:nvPr/>
+        </p:nvPicPr>
+        <p:blipFill>
+          <a:blip r:embed="rId2" cstate="print"/>
+          <a:srcRect/>
+          <a:stretch>
+            <a:fillRect/>
+          </a:stretch>
+        </p:blipFill>
+        <p:spPr bwMode="auto">
+          <a:xfrm>
+            <a:off x="53251" y="1196752"/>
+            <a:ext cx="9090749" cy="4413451"/>
+          </a:xfrm>
+          <a:prstGeom prst="rect">
+            <a:avLst/>
+          </a:prstGeom>
+          <a:ln w="38100" cap="sq">
+            <a:solidFill>
+              <a:srgbClr val="000000"/>
+            </a:solidFill>
+            <a:prstDash val="solid"/>
+            <a:miter lim="800000"/>
+          </a:ln>
+          <a:effectLst>
+            <a:outerShdw blurRad="50800" dist="38100" dir="2700000" algn="tl" rotWithShape="0">
+              <a:srgbClr val="000000">
+                <a:alpha val="43000"/>
+              </a:srgbClr>
+            </a:outerShdw>
+          </a:effectLst>
+        </p:spPr>
+      </p:pic>
+      <p:sp>
+        <p:nvSpPr>
+          <p:cNvPr id="6" name="ZoneTexte 5"/>
+          <p:cNvSpPr txBox="1"/>
+          <p:nvPr/>
+        </p:nvSpPr>
+        <p:spPr>
+          <a:xfrm>
+            <a:off x="1619672" y="6093296"/>
+            <a:ext cx="5925020" cy="369332"/>
+          </a:xfrm>
+          <a:prstGeom prst="rect">
+            <a:avLst/>
+          </a:prstGeom>
+          <a:noFill/>
+        </p:spPr>
+        <p:txBody>
+          <a:bodyPr wrap="none" rtlCol="0">
+            <a:spAutoFit/>
+          </a:bodyPr>
           <a:lstStyle/>
           <a:p>
             <a:r>
               <a:rPr lang="fr-FR" dirty="0" smtClean="0"/>
-              <a:t>Bilan Personnel Albert</a:t>
+              <a:t>Recherche dans la table personne pour afficher les utilisateur</a:t>
             </a:r>
             <a:endParaRPr lang="fr-FR" dirty="0"/>
           </a:p>
@@ -3815,27 +6017,139 @@
       </p:sp>
       <p:sp>
         <p:nvSpPr>
-          <p:cNvPr id="3" name="Espace réservé du contenu 2"/>
-          <p:cNvSpPr>
-            <a:spLocks noGrp="1"/>
-          </p:cNvSpPr>
-          <p:nvPr>
-            <p:ph idx="1"/>
-          </p:nvPr>
-        </p:nvSpPr>
-        <p:spPr/>
-        <p:txBody>
-          <a:bodyPr/>
-          <a:lstStyle/>
-          <a:p>
-            <a:r>
-              <a:rPr lang="fr-FR" smtClean="0"/>
-              <a:t>Objectif: </a:t>
-            </a:r>
-            <a:endParaRPr lang="fr-FR"/>
-          </a:p>
-        </p:txBody>
-      </p:sp>
+          <p:cNvPr id="7" name="ZoneTexte 6"/>
+          <p:cNvSpPr txBox="1"/>
+          <p:nvPr/>
+        </p:nvSpPr>
+        <p:spPr>
+          <a:xfrm>
+            <a:off x="827584" y="548680"/>
+            <a:ext cx="7458452" cy="369332"/>
+          </a:xfrm>
+          <a:prstGeom prst="rect">
+            <a:avLst/>
+          </a:prstGeom>
+          <a:noFill/>
+        </p:spPr>
+        <p:txBody>
+          <a:bodyPr wrap="none" rtlCol="0">
+            <a:spAutoFit/>
+          </a:bodyPr>
+          <a:lstStyle/>
+          <a:p>
+            <a:r>
+              <a:rPr lang="fr-FR" dirty="0" smtClean="0"/>
+              <a:t>Bouton pour ajouter un utilisateur, le supprimer ou modifier des informations</a:t>
+            </a:r>
+            <a:endParaRPr lang="fr-FR" dirty="0"/>
+          </a:p>
+        </p:txBody>
+      </p:sp>
+      <p:cxnSp>
+        <p:nvCxnSpPr>
+          <p:cNvPr id="9" name="Connecteur droit avec flèche 8"/>
+          <p:cNvCxnSpPr>
+            <a:stCxn id="7" idx="2"/>
+          </p:cNvCxnSpPr>
+          <p:nvPr/>
+        </p:nvCxnSpPr>
+        <p:spPr>
+          <a:xfrm>
+            <a:off x="4556810" y="918012"/>
+            <a:ext cx="87198" cy="2078940"/>
+          </a:xfrm>
+          <a:prstGeom prst="straightConnector1">
+            <a:avLst/>
+          </a:prstGeom>
+          <a:ln>
+            <a:tailEnd type="arrow"/>
+          </a:ln>
+        </p:spPr>
+        <p:style>
+          <a:lnRef idx="1">
+            <a:schemeClr val="dk1"/>
+          </a:lnRef>
+          <a:fillRef idx="0">
+            <a:schemeClr val="dk1"/>
+          </a:fillRef>
+          <a:effectRef idx="0">
+            <a:schemeClr val="dk1"/>
+          </a:effectRef>
+          <a:fontRef idx="minor">
+            <a:schemeClr val="tx1"/>
+          </a:fontRef>
+        </p:style>
+      </p:cxnSp>
+      <p:cxnSp>
+        <p:nvCxnSpPr>
+          <p:cNvPr id="11" name="Connecteur droit avec flèche 10"/>
+          <p:cNvCxnSpPr>
+            <a:stCxn id="7" idx="2"/>
+          </p:cNvCxnSpPr>
+          <p:nvPr/>
+        </p:nvCxnSpPr>
+        <p:spPr>
+          <a:xfrm>
+            <a:off x="4556810" y="918012"/>
+            <a:ext cx="1167318" cy="3087052"/>
+          </a:xfrm>
+          <a:prstGeom prst="straightConnector1">
+            <a:avLst/>
+          </a:prstGeom>
+          <a:ln>
+            <a:tailEnd type="arrow"/>
+          </a:ln>
+        </p:spPr>
+        <p:style>
+          <a:lnRef idx="1">
+            <a:schemeClr val="dk1"/>
+          </a:lnRef>
+          <a:fillRef idx="0">
+            <a:schemeClr val="dk1"/>
+          </a:fillRef>
+          <a:effectRef idx="0">
+            <a:schemeClr val="dk1"/>
+          </a:effectRef>
+          <a:fontRef idx="minor">
+            <a:schemeClr val="tx1"/>
+          </a:fontRef>
+        </p:style>
+      </p:cxnSp>
+      <p:cxnSp>
+        <p:nvCxnSpPr>
+          <p:cNvPr id="13" name="Connecteur droit avec flèche 12"/>
+          <p:cNvCxnSpPr>
+            <a:stCxn id="7" idx="2"/>
+          </p:cNvCxnSpPr>
+          <p:nvPr/>
+        </p:nvCxnSpPr>
+        <p:spPr>
+          <a:xfrm>
+            <a:off x="4556810" y="918012"/>
+            <a:ext cx="1599366" cy="3159060"/>
+          </a:xfrm>
+          <a:prstGeom prst="straightConnector1">
+            <a:avLst/>
+          </a:prstGeom>
+          <a:ln>
+            <a:tailEnd type="arrow"/>
+          </a:ln>
+        </p:spPr>
+        <p:style>
+          <a:lnRef idx="1">
+            <a:schemeClr val="dk1"/>
+          </a:lnRef>
+          <a:fillRef idx="0">
+            <a:schemeClr val="dk1"/>
+          </a:fillRef>
+          <a:effectRef idx="0">
+            <a:schemeClr val="dk1"/>
+          </a:effectRef>
+          <a:fontRef idx="minor">
+            <a:schemeClr val="tx1"/>
+          </a:fontRef>
+        </p:style>
+      </p:cxnSp>
     </p:spTree>
   </p:cSld>
   <p:clrMapOvr>
@@ -3877,32 +6191,146 @@
           <a:lstStyle/>
           <a:p>
             <a:r>
-              <a:rPr lang="fr-FR" dirty="0" smtClean="0"/>
-              <a:t>Bilan Yann</a:t>
-            </a:r>
-            <a:endParaRPr lang="fr-FR" dirty="0"/>
-          </a:p>
-        </p:txBody>
-      </p:sp>
-      <p:sp>
-        <p:nvSpPr>
-          <p:cNvPr id="3" name="Espace réservé du contenu 2"/>
-          <p:cNvSpPr>
-            <a:spLocks noGrp="1"/>
-          </p:cNvSpPr>
-          <p:nvPr>
-            <p:ph idx="1"/>
-          </p:nvPr>
-        </p:nvSpPr>
-        <p:spPr/>
-        <p:txBody>
-          <a:bodyPr/>
-          <a:lstStyle/>
-          <a:p>
-            <a:endParaRPr lang="fr-FR"/>
-          </a:p>
-        </p:txBody>
-      </p:sp>
+              <a:rPr lang="fr-FR" b="1" u="sng" dirty="0" err="1" smtClean="0">
+                <a:solidFill>
+                  <a:srgbClr val="FF0000"/>
+                </a:solidFill>
+              </a:rPr>
+              <a:t>Versonning</a:t>
+            </a:r>
+            <a:r>
+              <a:rPr lang="fr-FR" b="1" u="sng" dirty="0" smtClean="0">
+                <a:solidFill>
+                  <a:srgbClr val="FF0000"/>
+                </a:solidFill>
+              </a:rPr>
+              <a:t> GIT</a:t>
+            </a:r>
+            <a:endParaRPr lang="fr-FR" b="1" u="sng" dirty="0">
+              <a:solidFill>
+                <a:srgbClr val="FF0000"/>
+              </a:solidFill>
+            </a:endParaRPr>
+          </a:p>
+        </p:txBody>
+      </p:sp>
+      <p:pic>
+        <p:nvPicPr>
+          <p:cNvPr id="8193" name="Picture 1"/>
+          <p:cNvPicPr>
+            <a:picLocks noChangeAspect="1" noChangeArrowheads="1"/>
+          </p:cNvPicPr>
+          <p:nvPr/>
+        </p:nvPicPr>
+        <p:blipFill>
+          <a:blip r:embed="rId2" cstate="print"/>
+          <a:srcRect/>
+          <a:stretch>
+            <a:fillRect/>
+          </a:stretch>
+        </p:blipFill>
+        <p:spPr bwMode="auto">
+          <a:xfrm>
+            <a:off x="971600" y="4293096"/>
+            <a:ext cx="7200900" cy="1771650"/>
+          </a:xfrm>
+          <a:prstGeom prst="rect">
+            <a:avLst/>
+          </a:prstGeom>
+          <a:ln w="38100" cap="sq">
+            <a:solidFill>
+              <a:srgbClr val="000000"/>
+            </a:solidFill>
+            <a:prstDash val="solid"/>
+            <a:miter lim="800000"/>
+          </a:ln>
+          <a:effectLst>
+            <a:outerShdw blurRad="50800" dist="38100" dir="2700000" algn="tl" rotWithShape="0">
+              <a:srgbClr val="000000">
+                <a:alpha val="43000"/>
+              </a:srgbClr>
+            </a:outerShdw>
+          </a:effectLst>
+        </p:spPr>
+      </p:pic>
+      <p:pic>
+        <p:nvPicPr>
+          <p:cNvPr id="8194" name="Picture 2"/>
+          <p:cNvPicPr>
+            <a:picLocks noChangeAspect="1" noChangeArrowheads="1"/>
+          </p:cNvPicPr>
+          <p:nvPr/>
+        </p:nvPicPr>
+        <p:blipFill>
+          <a:blip r:embed="rId3" cstate="print"/>
+          <a:srcRect/>
+          <a:stretch>
+            <a:fillRect/>
+          </a:stretch>
+        </p:blipFill>
+        <p:spPr bwMode="auto">
+          <a:xfrm>
+            <a:off x="971600" y="3140968"/>
+            <a:ext cx="7181850" cy="1628775"/>
+          </a:xfrm>
+          <a:prstGeom prst="rect">
+            <a:avLst/>
+          </a:prstGeom>
+          <a:ln w="38100" cap="sq">
+            <a:solidFill>
+              <a:srgbClr val="000000"/>
+            </a:solidFill>
+            <a:prstDash val="solid"/>
+            <a:miter lim="800000"/>
+          </a:ln>
+          <a:effectLst>
+            <a:outerShdw blurRad="50800" dist="38100" dir="2700000" algn="tl" rotWithShape="0">
+              <a:srgbClr val="000000">
+                <a:alpha val="43000"/>
+              </a:srgbClr>
+            </a:outerShdw>
+          </a:effectLst>
+        </p:spPr>
+      </p:pic>
+      <p:pic>
+        <p:nvPicPr>
+          <p:cNvPr id="8195" name="Picture 3"/>
+          <p:cNvPicPr>
+            <a:picLocks noChangeAspect="1" noChangeArrowheads="1"/>
+          </p:cNvPicPr>
+          <p:nvPr/>
+        </p:nvPicPr>
+        <p:blipFill>
+          <a:blip r:embed="rId4" cstate="print"/>
+          <a:srcRect/>
+          <a:stretch>
+            <a:fillRect/>
+          </a:stretch>
+        </p:blipFill>
+        <p:spPr bwMode="auto">
+          <a:xfrm>
+            <a:off x="971600" y="1916832"/>
+            <a:ext cx="7143750" cy="1647825"/>
+          </a:xfrm>
+          <a:prstGeom prst="rect">
+            <a:avLst/>
+          </a:prstGeom>
+          <a:ln w="38100" cap="sq">
+            <a:solidFill>
+              <a:srgbClr val="000000"/>
+            </a:solidFill>
+            <a:prstDash val="solid"/>
+            <a:miter lim="800000"/>
+          </a:ln>
+          <a:effectLst>
+            <a:outerShdw blurRad="50800" dist="38100" dir="2700000" algn="tl" rotWithShape="0">
+              <a:srgbClr val="000000">
+                <a:alpha val="43000"/>
+              </a:srgbClr>
+            </a:outerShdw>
+          </a:effectLst>
+        </p:spPr>
+      </p:pic>
     </p:spTree>
   </p:cSld>
   <p:clrMapOvr>

</xml_diff>